<commit_message>
Agregado el logo del programa a las presentaciones
</commit_message>
<xml_diff>
--- a/Propuesta (Doc y Diap)/Dattex-Plus.pptx
+++ b/Propuesta (Doc y Diap)/Dattex-Plus.pptx
@@ -3893,6 +3893,30 @@
           </a:p>
         </p:txBody>
       </p:sp>
+      <p:pic>
+        <p:nvPicPr>
+          <p:cNvPr id="5" name="4 Imagen" descr="ICONO 1.jpg"/>
+          <p:cNvPicPr>
+            <a:picLocks noChangeAspect="1"/>
+          </p:cNvPicPr>
+          <p:nvPr/>
+        </p:nvPicPr>
+        <p:blipFill>
+          <a:blip r:embed="rId2"/>
+          <a:stretch>
+            <a:fillRect/>
+          </a:stretch>
+        </p:blipFill>
+        <p:spPr>
+          <a:xfrm>
+            <a:off x="7143768" y="4864456"/>
+            <a:ext cx="2000232" cy="1993543"/>
+          </a:xfrm>
+          <a:prstGeom prst="rect">
+            <a:avLst/>
+          </a:prstGeom>
+        </p:spPr>
+      </p:pic>
     </p:spTree>
   </p:cSld>
   <p:clrMapOvr>
@@ -3972,11 +3996,7 @@
             </a:pPr>
             <a:r>
               <a:rPr lang="es-GT" dirty="0" smtClean="0"/>
-              <a:t>Que </a:t>
-            </a:r>
-            <a:r>
-              <a:rPr lang="es-GT" dirty="0" smtClean="0"/>
-              <a:t>los trabajadores se familiaricen y experimenten el software con soporte inmediato.</a:t>
+              <a:t>Que los trabajadores se familiaricen y experimenten el software con soporte inmediato.</a:t>
             </a:r>
           </a:p>
           <a:p>
@@ -3994,6 +4014,30 @@
           </a:p>
         </p:txBody>
       </p:sp>
+      <p:pic>
+        <p:nvPicPr>
+          <p:cNvPr id="4" name="3 Imagen" descr="ICONO 1.jpg"/>
+          <p:cNvPicPr>
+            <a:picLocks noChangeAspect="1"/>
+          </p:cNvPicPr>
+          <p:nvPr/>
+        </p:nvPicPr>
+        <p:blipFill>
+          <a:blip r:embed="rId2"/>
+          <a:stretch>
+            <a:fillRect/>
+          </a:stretch>
+        </p:blipFill>
+        <p:spPr>
+          <a:xfrm>
+            <a:off x="7786710" y="5505248"/>
+            <a:ext cx="1357290" cy="1352751"/>
+          </a:xfrm>
+          <a:prstGeom prst="rect">
+            <a:avLst/>
+          </a:prstGeom>
+        </p:spPr>
+      </p:pic>
     </p:spTree>
   </p:cSld>
   <p:clrMapOvr>
@@ -4073,16 +4117,36 @@
             </a:pPr>
             <a:r>
               <a:rPr lang="es-GT" dirty="0" smtClean="0"/>
-              <a:t>Que </a:t>
-            </a:r>
-            <a:r>
-              <a:rPr lang="es-GT" dirty="0" smtClean="0"/>
-              <a:t>los trabajadores del área de bodega, ventas y el administrador conozcan en su totalidad la funcionalidad del software</a:t>
+              <a:t>Que los trabajadores del área de bodega, ventas y el administrador conozcan en su totalidad la funcionalidad del software</a:t>
             </a:r>
             <a:endParaRPr lang="es-GT" dirty="0"/>
           </a:p>
         </p:txBody>
       </p:sp>
+      <p:pic>
+        <p:nvPicPr>
+          <p:cNvPr id="4" name="3 Imagen" descr="ICONO 1.jpg"/>
+          <p:cNvPicPr>
+            <a:picLocks noChangeAspect="1"/>
+          </p:cNvPicPr>
+          <p:nvPr/>
+        </p:nvPicPr>
+        <p:blipFill>
+          <a:blip r:embed="rId2"/>
+          <a:stretch>
+            <a:fillRect/>
+          </a:stretch>
+        </p:blipFill>
+        <p:spPr>
+          <a:xfrm>
+            <a:off x="7786710" y="5505248"/>
+            <a:ext cx="1357290" cy="1352751"/>
+          </a:xfrm>
+          <a:prstGeom prst="rect">
+            <a:avLst/>
+          </a:prstGeom>
+        </p:spPr>
+      </p:pic>
     </p:spTree>
   </p:cSld>
   <p:clrMapOvr>
@@ -4157,6 +4221,30 @@
           </a:p>
         </p:txBody>
       </p:sp>
+      <p:pic>
+        <p:nvPicPr>
+          <p:cNvPr id="4" name="3 Imagen" descr="ICONO 1.jpg"/>
+          <p:cNvPicPr>
+            <a:picLocks noChangeAspect="1"/>
+          </p:cNvPicPr>
+          <p:nvPr/>
+        </p:nvPicPr>
+        <p:blipFill>
+          <a:blip r:embed="rId2"/>
+          <a:stretch>
+            <a:fillRect/>
+          </a:stretch>
+        </p:blipFill>
+        <p:spPr>
+          <a:xfrm>
+            <a:off x="7786710" y="5505248"/>
+            <a:ext cx="1357290" cy="1352751"/>
+          </a:xfrm>
+          <a:prstGeom prst="rect">
+            <a:avLst/>
+          </a:prstGeom>
+        </p:spPr>
+      </p:pic>
     </p:spTree>
   </p:cSld>
   <p:clrMapOvr>
@@ -4299,25 +4387,13 @@
           <a:p>
             <a:r>
               <a:rPr lang="es-GT" dirty="0" smtClean="0"/>
-              <a:t>Tiempo </a:t>
-            </a:r>
+              <a:t>Tiempo Estimado: 1 día (8 horas de trabajo)</a:t>
+            </a:r>
+          </a:p>
+          <a:p>
             <a:r>
               <a:rPr lang="es-GT" dirty="0" smtClean="0"/>
-              <a:t>Estimado: 1 día (8 horas de trabajo)</a:t>
-            </a:r>
-          </a:p>
-          <a:p>
-            <a:r>
-              <a:rPr lang="es-GT" dirty="0" smtClean="0"/>
-              <a:t>Número </a:t>
-            </a:r>
-            <a:r>
-              <a:rPr lang="es-GT" dirty="0" smtClean="0"/>
-              <a:t>de Implementadores: 1 </a:t>
-            </a:r>
-            <a:r>
-              <a:rPr lang="es-GT" dirty="0" smtClean="0"/>
-              <a:t>miembro</a:t>
+              <a:t>Número de Implementadores: 1 miembro</a:t>
             </a:r>
           </a:p>
           <a:p>
@@ -4331,6 +4407,30 @@
           </a:p>
         </p:txBody>
       </p:sp>
+      <p:pic>
+        <p:nvPicPr>
+          <p:cNvPr id="6" name="5 Imagen" descr="ICONO 1.jpg"/>
+          <p:cNvPicPr>
+            <a:picLocks noChangeAspect="1"/>
+          </p:cNvPicPr>
+          <p:nvPr/>
+        </p:nvPicPr>
+        <p:blipFill>
+          <a:blip r:embed="rId2"/>
+          <a:stretch>
+            <a:fillRect/>
+          </a:stretch>
+        </p:blipFill>
+        <p:spPr>
+          <a:xfrm>
+            <a:off x="7786710" y="5505248"/>
+            <a:ext cx="1357290" cy="1352751"/>
+          </a:xfrm>
+          <a:prstGeom prst="rect">
+            <a:avLst/>
+          </a:prstGeom>
+        </p:spPr>
+      </p:pic>
     </p:spTree>
   </p:cSld>
   <p:clrMapOvr>
@@ -4443,11 +4543,7 @@
             </a:r>
             <a:r>
               <a:rPr lang="en-US" dirty="0" smtClean="0"/>
-              <a:t> </a:t>
-            </a:r>
-            <a:r>
-              <a:rPr lang="en-US" dirty="0" smtClean="0"/>
-              <a:t>1000</a:t>
+              <a:t> 1000</a:t>
             </a:r>
           </a:p>
           <a:p>
@@ -4490,6 +4586,30 @@
           </a:p>
         </p:txBody>
       </p:sp>
+      <p:pic>
+        <p:nvPicPr>
+          <p:cNvPr id="4" name="3 Imagen" descr="ICONO 1.jpg"/>
+          <p:cNvPicPr>
+            <a:picLocks noChangeAspect="1"/>
+          </p:cNvPicPr>
+          <p:nvPr/>
+        </p:nvPicPr>
+        <p:blipFill>
+          <a:blip r:embed="rId2"/>
+          <a:stretch>
+            <a:fillRect/>
+          </a:stretch>
+        </p:blipFill>
+        <p:spPr>
+          <a:xfrm>
+            <a:off x="7786710" y="5505248"/>
+            <a:ext cx="1357290" cy="1352751"/>
+          </a:xfrm>
+          <a:prstGeom prst="rect">
+            <a:avLst/>
+          </a:prstGeom>
+        </p:spPr>
+      </p:pic>
     </p:spTree>
   </p:cSld>
   <p:clrMapOvr>
@@ -4610,6 +4730,30 @@
           </a:p>
         </p:txBody>
       </p:sp>
+      <p:pic>
+        <p:nvPicPr>
+          <p:cNvPr id="6" name="5 Imagen" descr="ICONO 1.jpg"/>
+          <p:cNvPicPr>
+            <a:picLocks noChangeAspect="1"/>
+          </p:cNvPicPr>
+          <p:nvPr/>
+        </p:nvPicPr>
+        <p:blipFill>
+          <a:blip r:embed="rId2"/>
+          <a:stretch>
+            <a:fillRect/>
+          </a:stretch>
+        </p:blipFill>
+        <p:spPr>
+          <a:xfrm>
+            <a:off x="7786710" y="5505248"/>
+            <a:ext cx="1357290" cy="1352751"/>
+          </a:xfrm>
+          <a:prstGeom prst="rect">
+            <a:avLst/>
+          </a:prstGeom>
+        </p:spPr>
+      </p:pic>
     </p:spTree>
   </p:cSld>
   <p:clrMapOvr>
@@ -4691,6 +4835,30 @@
           </a:p>
         </p:txBody>
       </p:sp>
+      <p:pic>
+        <p:nvPicPr>
+          <p:cNvPr id="4" name="3 Imagen" descr="ICONO 1.jpg"/>
+          <p:cNvPicPr>
+            <a:picLocks noChangeAspect="1"/>
+          </p:cNvPicPr>
+          <p:nvPr/>
+        </p:nvPicPr>
+        <p:blipFill>
+          <a:blip r:embed="rId2"/>
+          <a:stretch>
+            <a:fillRect/>
+          </a:stretch>
+        </p:blipFill>
+        <p:spPr>
+          <a:xfrm>
+            <a:off x="7786710" y="5505248"/>
+            <a:ext cx="1357290" cy="1352751"/>
+          </a:xfrm>
+          <a:prstGeom prst="rect">
+            <a:avLst/>
+          </a:prstGeom>
+        </p:spPr>
+      </p:pic>
     </p:spTree>
   </p:cSld>
   <p:clrMapOvr>
@@ -4831,6 +4999,30 @@
           </a:p>
         </p:txBody>
       </p:sp>
+      <p:pic>
+        <p:nvPicPr>
+          <p:cNvPr id="4" name="3 Imagen" descr="ICONO 1.jpg"/>
+          <p:cNvPicPr>
+            <a:picLocks noChangeAspect="1"/>
+          </p:cNvPicPr>
+          <p:nvPr/>
+        </p:nvPicPr>
+        <p:blipFill>
+          <a:blip r:embed="rId2"/>
+          <a:stretch>
+            <a:fillRect/>
+          </a:stretch>
+        </p:blipFill>
+        <p:spPr>
+          <a:xfrm>
+            <a:off x="7786710" y="5505248"/>
+            <a:ext cx="1357290" cy="1352751"/>
+          </a:xfrm>
+          <a:prstGeom prst="rect">
+            <a:avLst/>
+          </a:prstGeom>
+        </p:spPr>
+      </p:pic>
     </p:spTree>
   </p:cSld>
   <p:clrMapOvr>
@@ -5005,6 +5197,30 @@
           </a:p>
         </p:txBody>
       </p:sp>
+      <p:pic>
+        <p:nvPicPr>
+          <p:cNvPr id="6" name="5 Imagen" descr="ICONO 1.jpg"/>
+          <p:cNvPicPr>
+            <a:picLocks noChangeAspect="1"/>
+          </p:cNvPicPr>
+          <p:nvPr/>
+        </p:nvPicPr>
+        <p:blipFill>
+          <a:blip r:embed="rId2"/>
+          <a:stretch>
+            <a:fillRect/>
+          </a:stretch>
+        </p:blipFill>
+        <p:spPr>
+          <a:xfrm>
+            <a:off x="7786710" y="5505248"/>
+            <a:ext cx="1357290" cy="1352751"/>
+          </a:xfrm>
+          <a:prstGeom prst="rect">
+            <a:avLst/>
+          </a:prstGeom>
+        </p:spPr>
+      </p:pic>
     </p:spTree>
   </p:cSld>
   <p:clrMapOvr>
@@ -5225,16 +5441,36 @@
           <a:p>
             <a:r>
               <a:rPr lang="es-GT" dirty="0" smtClean="0"/>
-              <a:t>Todo </a:t>
-            </a:r>
-            <a:r>
-              <a:rPr lang="es-GT" dirty="0" smtClean="0"/>
-              <a:t>el personal de la empresa</a:t>
+              <a:t>Todo el personal de la empresa</a:t>
             </a:r>
             <a:endParaRPr lang="es-GT" dirty="0"/>
           </a:p>
         </p:txBody>
       </p:sp>
+      <p:pic>
+        <p:nvPicPr>
+          <p:cNvPr id="6" name="5 Imagen" descr="ICONO 1.jpg"/>
+          <p:cNvPicPr>
+            <a:picLocks noChangeAspect="1"/>
+          </p:cNvPicPr>
+          <p:nvPr/>
+        </p:nvPicPr>
+        <p:blipFill>
+          <a:blip r:embed="rId2"/>
+          <a:stretch>
+            <a:fillRect/>
+          </a:stretch>
+        </p:blipFill>
+        <p:spPr>
+          <a:xfrm>
+            <a:off x="7786710" y="5505248"/>
+            <a:ext cx="1357290" cy="1352751"/>
+          </a:xfrm>
+          <a:prstGeom prst="rect">
+            <a:avLst/>
+          </a:prstGeom>
+        </p:spPr>
+      </p:pic>
     </p:spTree>
   </p:cSld>
   <p:clrMapOvr>

</xml_diff>

<commit_message>
Actualicé la presentación, agregué la tabla costo beneficio
</commit_message>
<xml_diff>
--- a/Propuesta (Doc y Diap)/Dattex-Plus.pptx
+++ b/Propuesta (Doc y Diap)/Dattex-Plus.pptx
@@ -21,6 +21,8 @@
     <p:sldId id="264" r:id="rId15"/>
     <p:sldId id="266" r:id="rId16"/>
     <p:sldId id="267" r:id="rId17"/>
+    <p:sldId id="272" r:id="rId18"/>
+    <p:sldId id="273" r:id="rId19"/>
   </p:sldIdLst>
   <p:sldSz cx="9144000" cy="6858000" type="screen4x3"/>
   <p:notesSz cx="6858000" cy="9144000"/>
@@ -4239,7 +4241,7 @@
           <a:blip r:embed="rId3">
             <a:extLst>
               <a:ext uri="{28A0092B-C50C-407E-A947-70E740481C1C}">
-                <a14:useLocalDpi xmlns:a14="http://schemas.microsoft.com/office/drawing/2010/main" val="0"/>
+                <a14:useLocalDpi xmlns="" xmlns:a14="http://schemas.microsoft.com/office/drawing/2010/main" val="0"/>
               </a:ext>
             </a:extLst>
           </a:blip>
@@ -4261,14 +4263,14 @@
           <a:effectLst/>
           <a:extLst>
             <a:ext uri="{909E8E84-426E-40DD-AFC4-6F175D3DCCD1}">
-              <a14:hiddenFill xmlns:a14="http://schemas.microsoft.com/office/drawing/2010/main">
+              <a14:hiddenFill xmlns="" xmlns:a14="http://schemas.microsoft.com/office/drawing/2010/main">
                 <a:solidFill>
                   <a:schemeClr val="accent1"/>
                 </a:solidFill>
               </a14:hiddenFill>
             </a:ext>
             <a:ext uri="{91240B29-F687-4F45-9708-019B960494DF}">
-              <a14:hiddenLine xmlns:a14="http://schemas.microsoft.com/office/drawing/2010/main" w="9525">
+              <a14:hiddenLine xmlns="" xmlns:a14="http://schemas.microsoft.com/office/drawing/2010/main" w="9525">
                 <a:solidFill>
                   <a:schemeClr val="tx1"/>
                 </a:solidFill>
@@ -4278,7 +4280,7 @@
               </a14:hiddenLine>
             </a:ext>
             <a:ext uri="{AF507438-7753-43E0-B8FC-AC1667EBCBE1}">
-              <a14:hiddenEffects xmlns:a14="http://schemas.microsoft.com/office/drawing/2010/main">
+              <a14:hiddenEffects xmlns="" xmlns:a14="http://schemas.microsoft.com/office/drawing/2010/main">
                 <a:effectLst>
                   <a:outerShdw dist="35921" dir="2700000" algn="ctr" rotWithShape="0">
                     <a:schemeClr val="bg2"/>
@@ -4364,7 +4366,7 @@
           </a:ln>
           <a:extLst>
             <a:ext uri="{53640926-AAD7-44D8-BBD7-CCE9431645EC}">
-              <a14:shadowObscured xmlns:a14="http://schemas.microsoft.com/office/drawing/2010/main"/>
+              <a14:shadowObscured xmlns="" xmlns:a14="http://schemas.microsoft.com/office/drawing/2010/main"/>
             </a:ext>
           </a:extLst>
         </p:spPr>
@@ -4372,7 +4374,7 @@
     </p:spTree>
     <p:extLst>
       <p:ext uri="{BB962C8B-B14F-4D97-AF65-F5344CB8AC3E}">
-        <p14:creationId xmlns:p14="http://schemas.microsoft.com/office/powerpoint/2010/main" val="3901028638"/>
+        <p14:creationId xmlns="" xmlns:p14="http://schemas.microsoft.com/office/powerpoint/2010/main" val="3901028638"/>
       </p:ext>
     </p:extLst>
   </p:cSld>
@@ -4744,6 +4746,927 @@
       </p:par>
     </p:tnLst>
   </p:timing>
+</p:sld>
+</file>
+
+<file path=ppt/slides/slide17.xml><?xml version="1.0" encoding="utf-8"?>
+<p:sld xmlns:a="http://schemas.openxmlformats.org/drawingml/2006/main" xmlns:r="http://schemas.openxmlformats.org/officeDocument/2006/relationships" xmlns:p="http://schemas.openxmlformats.org/presentationml/2006/main">
+  <p:cSld>
+    <p:spTree>
+      <p:nvGrpSpPr>
+        <p:cNvPr id="1" name=""/>
+        <p:cNvGrpSpPr/>
+        <p:nvPr/>
+      </p:nvGrpSpPr>
+      <p:grpSpPr>
+        <a:xfrm>
+          <a:off x="0" y="0"/>
+          <a:ext cx="0" cy="0"/>
+          <a:chOff x="0" y="0"/>
+          <a:chExt cx="0" cy="0"/>
+        </a:xfrm>
+      </p:grpSpPr>
+      <p:sp>
+        <p:nvSpPr>
+          <p:cNvPr id="2" name="1 Título"/>
+          <p:cNvSpPr>
+            <a:spLocks noGrp="1"/>
+          </p:cNvSpPr>
+          <p:nvPr>
+            <p:ph type="title"/>
+          </p:nvPr>
+        </p:nvSpPr>
+        <p:spPr/>
+        <p:txBody>
+          <a:bodyPr/>
+          <a:lstStyle/>
+          <a:p>
+            <a:r>
+              <a:rPr lang="es-GT" smtClean="0"/>
+              <a:t>Costo</a:t>
+            </a:r>
+            <a:endParaRPr lang="es-GT" dirty="0"/>
+          </a:p>
+        </p:txBody>
+      </p:sp>
+      <p:sp>
+        <p:nvSpPr>
+          <p:cNvPr id="4" name="3 Marcador de texto"/>
+          <p:cNvSpPr>
+            <a:spLocks noGrp="1"/>
+          </p:cNvSpPr>
+          <p:nvPr>
+            <p:ph type="body" idx="1"/>
+          </p:nvPr>
+        </p:nvSpPr>
+        <p:spPr/>
+        <p:txBody>
+          <a:bodyPr/>
+          <a:lstStyle/>
+          <a:p>
+            <a:endParaRPr lang="es-GT"/>
+          </a:p>
+        </p:txBody>
+      </p:sp>
+    </p:spTree>
+  </p:cSld>
+  <p:clrMapOvr>
+    <a:masterClrMapping/>
+  </p:clrMapOvr>
+</p:sld>
+</file>
+
+<file path=ppt/slides/slide18.xml><?xml version="1.0" encoding="utf-8"?>
+<p:sld xmlns:a="http://schemas.openxmlformats.org/drawingml/2006/main" xmlns:r="http://schemas.openxmlformats.org/officeDocument/2006/relationships" xmlns:p="http://schemas.openxmlformats.org/presentationml/2006/main">
+  <p:cSld>
+    <p:spTree>
+      <p:nvGrpSpPr>
+        <p:cNvPr id="1" name=""/>
+        <p:cNvGrpSpPr/>
+        <p:nvPr/>
+      </p:nvGrpSpPr>
+      <p:grpSpPr>
+        <a:xfrm>
+          <a:off x="0" y="0"/>
+          <a:ext cx="0" cy="0"/>
+          <a:chOff x="0" y="0"/>
+          <a:chExt cx="0" cy="0"/>
+        </a:xfrm>
+      </p:grpSpPr>
+      <p:sp>
+        <p:nvSpPr>
+          <p:cNvPr id="4" name="3 Título"/>
+          <p:cNvSpPr>
+            <a:spLocks noGrp="1"/>
+          </p:cNvSpPr>
+          <p:nvPr>
+            <p:ph type="title"/>
+          </p:nvPr>
+        </p:nvSpPr>
+        <p:spPr/>
+        <p:txBody>
+          <a:bodyPr/>
+          <a:lstStyle/>
+          <a:p>
+            <a:r>
+              <a:rPr lang="es-GT" dirty="0" smtClean="0"/>
+              <a:t>Análisis costo-beneficio</a:t>
+            </a:r>
+            <a:endParaRPr lang="es-GT" dirty="0"/>
+          </a:p>
+        </p:txBody>
+      </p:sp>
+      <p:graphicFrame>
+        <p:nvGraphicFramePr>
+          <p:cNvPr id="6" name="5 Marcador de contenido"/>
+          <p:cNvGraphicFramePr>
+            <a:graphicFrameLocks noGrp="1"/>
+          </p:cNvGraphicFramePr>
+          <p:nvPr>
+            <p:ph idx="1"/>
+          </p:nvPr>
+        </p:nvGraphicFramePr>
+        <p:xfrm>
+          <a:off x="383940" y="1857366"/>
+          <a:ext cx="8188588" cy="3946364"/>
+        </p:xfrm>
+        <a:graphic>
+          <a:graphicData uri="http://schemas.openxmlformats.org/drawingml/2006/table">
+            <a:tbl>
+              <a:tblPr/>
+              <a:tblGrid>
+                <a:gridCol w="2838469"/>
+                <a:gridCol w="5350119"/>
+              </a:tblGrid>
+              <a:tr h="540887">
+                <a:tc>
+                  <a:txBody>
+                    <a:bodyPr/>
+                    <a:lstStyle/>
+                    <a:p>
+                      <a:pPr algn="ctr">
+                        <a:lnSpc>
+                          <a:spcPct val="115000"/>
+                        </a:lnSpc>
+                        <a:spcAft>
+                          <a:spcPts val="0"/>
+                        </a:spcAft>
+                      </a:pPr>
+                      <a:r>
+                        <a:rPr lang="es-GT" sz="1600" b="1">
+                          <a:solidFill>
+                            <a:srgbClr val="000000"/>
+                          </a:solidFill>
+                          <a:latin typeface="Calibri"/>
+                          <a:ea typeface="Times New Roman"/>
+                          <a:cs typeface="Calibri"/>
+                        </a:rPr>
+                        <a:t>Costos del Sistema</a:t>
+                      </a:r>
+                      <a:endParaRPr lang="es-GT" sz="1200">
+                        <a:latin typeface="Calibri"/>
+                        <a:ea typeface="Calibri"/>
+                        <a:cs typeface="Times New Roman"/>
+                      </a:endParaRPr>
+                    </a:p>
+                  </a:txBody>
+                  <a:tcPr marL="50368" marR="50368" marT="0" marB="0" anchor="ctr">
+                    <a:lnL w="12700" cap="flat" cmpd="sng" algn="ctr">
+                      <a:solidFill>
+                        <a:srgbClr val="000000"/>
+                      </a:solidFill>
+                      <a:prstDash val="solid"/>
+                      <a:round/>
+                      <a:headEnd type="none" w="med" len="med"/>
+                      <a:tailEnd type="none" w="med" len="med"/>
+                    </a:lnL>
+                    <a:lnR w="12700" cap="flat" cmpd="sng" algn="ctr">
+                      <a:solidFill>
+                        <a:srgbClr val="000000"/>
+                      </a:solidFill>
+                      <a:prstDash val="solid"/>
+                      <a:round/>
+                      <a:headEnd type="none" w="med" len="med"/>
+                      <a:tailEnd type="none" w="med" len="med"/>
+                    </a:lnR>
+                    <a:lnT w="12700" cap="flat" cmpd="sng" algn="ctr">
+                      <a:solidFill>
+                        <a:srgbClr val="000000"/>
+                      </a:solidFill>
+                      <a:prstDash val="solid"/>
+                      <a:round/>
+                      <a:headEnd type="none" w="med" len="med"/>
+                      <a:tailEnd type="none" w="med" len="med"/>
+                    </a:lnT>
+                    <a:lnB w="12700" cap="flat" cmpd="sng" algn="ctr">
+                      <a:solidFill>
+                        <a:srgbClr val="000000"/>
+                      </a:solidFill>
+                      <a:prstDash val="solid"/>
+                      <a:round/>
+                      <a:headEnd type="none" w="med" len="med"/>
+                      <a:tailEnd type="none" w="med" len="med"/>
+                    </a:lnB>
+                  </a:tcPr>
+                </a:tc>
+                <a:tc>
+                  <a:txBody>
+                    <a:bodyPr/>
+                    <a:lstStyle/>
+                    <a:p>
+                      <a:pPr algn="ctr">
+                        <a:lnSpc>
+                          <a:spcPct val="115000"/>
+                        </a:lnSpc>
+                        <a:spcAft>
+                          <a:spcPts val="0"/>
+                        </a:spcAft>
+                      </a:pPr>
+                      <a:r>
+                        <a:rPr lang="es-GT" sz="1600" b="1">
+                          <a:solidFill>
+                            <a:srgbClr val="000000"/>
+                          </a:solidFill>
+                          <a:latin typeface="Calibri"/>
+                          <a:ea typeface="Times New Roman"/>
+                          <a:cs typeface="Calibri"/>
+                        </a:rPr>
+                        <a:t>Beneficios del Sistema</a:t>
+                      </a:r>
+                      <a:endParaRPr lang="es-GT" sz="1200">
+                        <a:latin typeface="Calibri"/>
+                        <a:ea typeface="Calibri"/>
+                        <a:cs typeface="Times New Roman"/>
+                      </a:endParaRPr>
+                    </a:p>
+                  </a:txBody>
+                  <a:tcPr marL="50368" marR="50368" marT="0" marB="0" anchor="ctr">
+                    <a:lnL w="12700" cap="flat" cmpd="sng" algn="ctr">
+                      <a:solidFill>
+                        <a:srgbClr val="000000"/>
+                      </a:solidFill>
+                      <a:prstDash val="solid"/>
+                      <a:round/>
+                      <a:headEnd type="none" w="med" len="med"/>
+                      <a:tailEnd type="none" w="med" len="med"/>
+                    </a:lnL>
+                    <a:lnR w="12700" cap="flat" cmpd="sng" algn="ctr">
+                      <a:solidFill>
+                        <a:srgbClr val="000000"/>
+                      </a:solidFill>
+                      <a:prstDash val="solid"/>
+                      <a:round/>
+                      <a:headEnd type="none" w="med" len="med"/>
+                      <a:tailEnd type="none" w="med" len="med"/>
+                    </a:lnR>
+                    <a:lnT w="12700" cap="flat" cmpd="sng" algn="ctr">
+                      <a:solidFill>
+                        <a:srgbClr val="000000"/>
+                      </a:solidFill>
+                      <a:prstDash val="solid"/>
+                      <a:round/>
+                      <a:headEnd type="none" w="med" len="med"/>
+                      <a:tailEnd type="none" w="med" len="med"/>
+                    </a:lnT>
+                    <a:lnB w="12700" cap="flat" cmpd="sng" algn="ctr">
+                      <a:solidFill>
+                        <a:srgbClr val="000000"/>
+                      </a:solidFill>
+                      <a:prstDash val="solid"/>
+                      <a:round/>
+                      <a:headEnd type="none" w="med" len="med"/>
+                      <a:tailEnd type="none" w="med" len="med"/>
+                    </a:lnB>
+                  </a:tcPr>
+                </a:tc>
+              </a:tr>
+              <a:tr h="540887">
+                <a:tc>
+                  <a:txBody>
+                    <a:bodyPr/>
+                    <a:lstStyle/>
+                    <a:p>
+                      <a:pPr>
+                        <a:lnSpc>
+                          <a:spcPct val="115000"/>
+                        </a:lnSpc>
+                        <a:spcAft>
+                          <a:spcPts val="0"/>
+                        </a:spcAft>
+                      </a:pPr>
+                      <a:r>
+                        <a:rPr lang="es-GT" sz="2000">
+                          <a:solidFill>
+                            <a:srgbClr val="000000"/>
+                          </a:solidFill>
+                          <a:latin typeface="Calibri"/>
+                          <a:ea typeface="Times New Roman"/>
+                          <a:cs typeface="Calibri"/>
+                        </a:rPr>
+                        <a:t> - Compra de equipo</a:t>
+                      </a:r>
+                      <a:endParaRPr lang="es-GT" sz="2000">
+                        <a:latin typeface="Calibri"/>
+                        <a:ea typeface="Calibri"/>
+                        <a:cs typeface="Times New Roman"/>
+                      </a:endParaRPr>
+                    </a:p>
+                  </a:txBody>
+                  <a:tcPr marL="50368" marR="50368" marT="0" marB="0" anchor="ctr">
+                    <a:lnL w="12700" cap="flat" cmpd="sng" algn="ctr">
+                      <a:solidFill>
+                        <a:srgbClr val="000000"/>
+                      </a:solidFill>
+                      <a:prstDash val="solid"/>
+                      <a:round/>
+                      <a:headEnd type="none" w="med" len="med"/>
+                      <a:tailEnd type="none" w="med" len="med"/>
+                    </a:lnL>
+                    <a:lnR w="12700" cap="flat" cmpd="sng" algn="ctr">
+                      <a:solidFill>
+                        <a:srgbClr val="000000"/>
+                      </a:solidFill>
+                      <a:prstDash val="solid"/>
+                      <a:round/>
+                      <a:headEnd type="none" w="med" len="med"/>
+                      <a:tailEnd type="none" w="med" len="med"/>
+                    </a:lnR>
+                    <a:lnT w="12700" cap="flat" cmpd="sng" algn="ctr">
+                      <a:solidFill>
+                        <a:srgbClr val="000000"/>
+                      </a:solidFill>
+                      <a:prstDash val="solid"/>
+                      <a:round/>
+                      <a:headEnd type="none" w="med" len="med"/>
+                      <a:tailEnd type="none" w="med" len="med"/>
+                    </a:lnT>
+                    <a:lnB>
+                      <a:noFill/>
+                    </a:lnB>
+                  </a:tcPr>
+                </a:tc>
+                <a:tc>
+                  <a:txBody>
+                    <a:bodyPr/>
+                    <a:lstStyle/>
+                    <a:p>
+                      <a:pPr>
+                        <a:lnSpc>
+                          <a:spcPct val="115000"/>
+                        </a:lnSpc>
+                        <a:spcAft>
+                          <a:spcPts val="0"/>
+                        </a:spcAft>
+                      </a:pPr>
+                      <a:r>
+                        <a:rPr lang="es-GT" sz="2000">
+                          <a:solidFill>
+                            <a:srgbClr val="000000"/>
+                          </a:solidFill>
+                          <a:latin typeface="Calibri"/>
+                          <a:ea typeface="Times New Roman"/>
+                          <a:cs typeface="Calibri"/>
+                        </a:rPr>
+                        <a:t> - Aumento en utilidades al tener una mejor organización</a:t>
+                      </a:r>
+                      <a:endParaRPr lang="es-GT" sz="2000">
+                        <a:latin typeface="Calibri"/>
+                        <a:ea typeface="Calibri"/>
+                        <a:cs typeface="Times New Roman"/>
+                      </a:endParaRPr>
+                    </a:p>
+                  </a:txBody>
+                  <a:tcPr marL="50368" marR="50368" marT="0" marB="0" anchor="b">
+                    <a:lnL w="12700" cap="flat" cmpd="sng" algn="ctr">
+                      <a:solidFill>
+                        <a:srgbClr val="000000"/>
+                      </a:solidFill>
+                      <a:prstDash val="solid"/>
+                      <a:round/>
+                      <a:headEnd type="none" w="med" len="med"/>
+                      <a:tailEnd type="none" w="med" len="med"/>
+                    </a:lnL>
+                    <a:lnR w="12700" cap="flat" cmpd="sng" algn="ctr">
+                      <a:solidFill>
+                        <a:srgbClr val="000000"/>
+                      </a:solidFill>
+                      <a:prstDash val="solid"/>
+                      <a:round/>
+                      <a:headEnd type="none" w="med" len="med"/>
+                      <a:tailEnd type="none" w="med" len="med"/>
+                    </a:lnR>
+                    <a:lnT w="12700" cap="flat" cmpd="sng" algn="ctr">
+                      <a:solidFill>
+                        <a:srgbClr val="000000"/>
+                      </a:solidFill>
+                      <a:prstDash val="solid"/>
+                      <a:round/>
+                      <a:headEnd type="none" w="med" len="med"/>
+                      <a:tailEnd type="none" w="med" len="med"/>
+                    </a:lnT>
+                    <a:lnB>
+                      <a:noFill/>
+                    </a:lnB>
+                  </a:tcPr>
+                </a:tc>
+              </a:tr>
+              <a:tr h="540887">
+                <a:tc>
+                  <a:txBody>
+                    <a:bodyPr/>
+                    <a:lstStyle/>
+                    <a:p>
+                      <a:pPr>
+                        <a:lnSpc>
+                          <a:spcPct val="115000"/>
+                        </a:lnSpc>
+                        <a:spcAft>
+                          <a:spcPts val="0"/>
+                        </a:spcAft>
+                      </a:pPr>
+                      <a:r>
+                        <a:rPr lang="es-GT" sz="2000">
+                          <a:solidFill>
+                            <a:srgbClr val="000000"/>
+                          </a:solidFill>
+                          <a:latin typeface="Calibri"/>
+                          <a:ea typeface="Times New Roman"/>
+                          <a:cs typeface="Calibri"/>
+                        </a:rPr>
+                        <a:t> - Instalación de equipo</a:t>
+                      </a:r>
+                      <a:endParaRPr lang="es-GT" sz="2000">
+                        <a:latin typeface="Calibri"/>
+                        <a:ea typeface="Calibri"/>
+                        <a:cs typeface="Times New Roman"/>
+                      </a:endParaRPr>
+                    </a:p>
+                  </a:txBody>
+                  <a:tcPr marL="50368" marR="50368" marT="0" marB="0" anchor="ctr">
+                    <a:lnL w="12700" cap="flat" cmpd="sng" algn="ctr">
+                      <a:solidFill>
+                        <a:srgbClr val="000000"/>
+                      </a:solidFill>
+                      <a:prstDash val="solid"/>
+                      <a:round/>
+                      <a:headEnd type="none" w="med" len="med"/>
+                      <a:tailEnd type="none" w="med" len="med"/>
+                    </a:lnL>
+                    <a:lnR w="12700" cap="flat" cmpd="sng" algn="ctr">
+                      <a:solidFill>
+                        <a:srgbClr val="000000"/>
+                      </a:solidFill>
+                      <a:prstDash val="solid"/>
+                      <a:round/>
+                      <a:headEnd type="none" w="med" len="med"/>
+                      <a:tailEnd type="none" w="med" len="med"/>
+                    </a:lnR>
+                    <a:lnT>
+                      <a:noFill/>
+                    </a:lnT>
+                    <a:lnB>
+                      <a:noFill/>
+                    </a:lnB>
+                  </a:tcPr>
+                </a:tc>
+                <a:tc>
+                  <a:txBody>
+                    <a:bodyPr/>
+                    <a:lstStyle/>
+                    <a:p>
+                      <a:pPr>
+                        <a:lnSpc>
+                          <a:spcPct val="115000"/>
+                        </a:lnSpc>
+                        <a:spcAft>
+                          <a:spcPts val="0"/>
+                        </a:spcAft>
+                      </a:pPr>
+                      <a:r>
+                        <a:rPr lang="es-GT" sz="2000">
+                          <a:solidFill>
+                            <a:srgbClr val="000000"/>
+                          </a:solidFill>
+                          <a:latin typeface="Calibri"/>
+                          <a:ea typeface="Times New Roman"/>
+                          <a:cs typeface="Calibri"/>
+                        </a:rPr>
+                        <a:t> - Mejora en la administración de personal</a:t>
+                      </a:r>
+                      <a:endParaRPr lang="es-GT" sz="2000">
+                        <a:latin typeface="Calibri"/>
+                        <a:ea typeface="Calibri"/>
+                        <a:cs typeface="Times New Roman"/>
+                      </a:endParaRPr>
+                    </a:p>
+                  </a:txBody>
+                  <a:tcPr marL="50368" marR="50368" marT="0" marB="0" anchor="b">
+                    <a:lnL w="12700" cap="flat" cmpd="sng" algn="ctr">
+                      <a:solidFill>
+                        <a:srgbClr val="000000"/>
+                      </a:solidFill>
+                      <a:prstDash val="solid"/>
+                      <a:round/>
+                      <a:headEnd type="none" w="med" len="med"/>
+                      <a:tailEnd type="none" w="med" len="med"/>
+                    </a:lnL>
+                    <a:lnR w="12700" cap="flat" cmpd="sng" algn="ctr">
+                      <a:solidFill>
+                        <a:srgbClr val="000000"/>
+                      </a:solidFill>
+                      <a:prstDash val="solid"/>
+                      <a:round/>
+                      <a:headEnd type="none" w="med" len="med"/>
+                      <a:tailEnd type="none" w="med" len="med"/>
+                    </a:lnR>
+                    <a:lnT>
+                      <a:noFill/>
+                    </a:lnT>
+                    <a:lnB>
+                      <a:noFill/>
+                    </a:lnB>
+                  </a:tcPr>
+                </a:tc>
+              </a:tr>
+              <a:tr h="540887">
+                <a:tc>
+                  <a:txBody>
+                    <a:bodyPr/>
+                    <a:lstStyle/>
+                    <a:p>
+                      <a:pPr>
+                        <a:lnSpc>
+                          <a:spcPct val="115000"/>
+                        </a:lnSpc>
+                        <a:spcAft>
+                          <a:spcPts val="0"/>
+                        </a:spcAft>
+                      </a:pPr>
+                      <a:r>
+                        <a:rPr lang="es-GT" sz="2000">
+                          <a:solidFill>
+                            <a:srgbClr val="000000"/>
+                          </a:solidFill>
+                          <a:latin typeface="Calibri"/>
+                          <a:ea typeface="Times New Roman"/>
+                          <a:cs typeface="Calibri"/>
+                        </a:rPr>
+                        <a:t> - Compra del software</a:t>
+                      </a:r>
+                      <a:endParaRPr lang="es-GT" sz="2000">
+                        <a:latin typeface="Calibri"/>
+                        <a:ea typeface="Calibri"/>
+                        <a:cs typeface="Times New Roman"/>
+                      </a:endParaRPr>
+                    </a:p>
+                  </a:txBody>
+                  <a:tcPr marL="50368" marR="50368" marT="0" marB="0" anchor="ctr">
+                    <a:lnL w="12700" cap="flat" cmpd="sng" algn="ctr">
+                      <a:solidFill>
+                        <a:srgbClr val="000000"/>
+                      </a:solidFill>
+                      <a:prstDash val="solid"/>
+                      <a:round/>
+                      <a:headEnd type="none" w="med" len="med"/>
+                      <a:tailEnd type="none" w="med" len="med"/>
+                    </a:lnL>
+                    <a:lnR w="12700" cap="flat" cmpd="sng" algn="ctr">
+                      <a:solidFill>
+                        <a:srgbClr val="000000"/>
+                      </a:solidFill>
+                      <a:prstDash val="solid"/>
+                      <a:round/>
+                      <a:headEnd type="none" w="med" len="med"/>
+                      <a:tailEnd type="none" w="med" len="med"/>
+                    </a:lnR>
+                    <a:lnT>
+                      <a:noFill/>
+                    </a:lnT>
+                    <a:lnB>
+                      <a:noFill/>
+                    </a:lnB>
+                  </a:tcPr>
+                </a:tc>
+                <a:tc>
+                  <a:txBody>
+                    <a:bodyPr/>
+                    <a:lstStyle/>
+                    <a:p>
+                      <a:pPr>
+                        <a:lnSpc>
+                          <a:spcPct val="115000"/>
+                        </a:lnSpc>
+                        <a:spcAft>
+                          <a:spcPts val="0"/>
+                        </a:spcAft>
+                      </a:pPr>
+                      <a:r>
+                        <a:rPr lang="es-GT" sz="2000">
+                          <a:solidFill>
+                            <a:srgbClr val="000000"/>
+                          </a:solidFill>
+                          <a:latin typeface="Calibri"/>
+                          <a:ea typeface="Times New Roman"/>
+                          <a:cs typeface="Calibri"/>
+                        </a:rPr>
+                        <a:t> - Organización y control preciso del inventario</a:t>
+                      </a:r>
+                      <a:endParaRPr lang="es-GT" sz="2000">
+                        <a:latin typeface="Calibri"/>
+                        <a:ea typeface="Calibri"/>
+                        <a:cs typeface="Times New Roman"/>
+                      </a:endParaRPr>
+                    </a:p>
+                  </a:txBody>
+                  <a:tcPr marL="50368" marR="50368" marT="0" marB="0" anchor="b">
+                    <a:lnL w="12700" cap="flat" cmpd="sng" algn="ctr">
+                      <a:solidFill>
+                        <a:srgbClr val="000000"/>
+                      </a:solidFill>
+                      <a:prstDash val="solid"/>
+                      <a:round/>
+                      <a:headEnd type="none" w="med" len="med"/>
+                      <a:tailEnd type="none" w="med" len="med"/>
+                    </a:lnL>
+                    <a:lnR w="12700" cap="flat" cmpd="sng" algn="ctr">
+                      <a:solidFill>
+                        <a:srgbClr val="000000"/>
+                      </a:solidFill>
+                      <a:prstDash val="solid"/>
+                      <a:round/>
+                      <a:headEnd type="none" w="med" len="med"/>
+                      <a:tailEnd type="none" w="med" len="med"/>
+                    </a:lnR>
+                    <a:lnT>
+                      <a:noFill/>
+                    </a:lnT>
+                    <a:lnB>
+                      <a:noFill/>
+                    </a:lnB>
+                  </a:tcPr>
+                </a:tc>
+              </a:tr>
+              <a:tr h="1081776">
+                <a:tc>
+                  <a:txBody>
+                    <a:bodyPr/>
+                    <a:lstStyle/>
+                    <a:p>
+                      <a:pPr>
+                        <a:lnSpc>
+                          <a:spcPct val="115000"/>
+                        </a:lnSpc>
+                        <a:spcAft>
+                          <a:spcPts val="0"/>
+                        </a:spcAft>
+                      </a:pPr>
+                      <a:r>
+                        <a:rPr lang="es-GT" sz="2000">
+                          <a:solidFill>
+                            <a:srgbClr val="000000"/>
+                          </a:solidFill>
+                          <a:latin typeface="Calibri"/>
+                          <a:ea typeface="Times New Roman"/>
+                          <a:cs typeface="Calibri"/>
+                        </a:rPr>
+                        <a:t> - Mantenimiento de software</a:t>
+                      </a:r>
+                      <a:endParaRPr lang="es-GT" sz="2000">
+                        <a:latin typeface="Calibri"/>
+                        <a:ea typeface="Calibri"/>
+                        <a:cs typeface="Times New Roman"/>
+                      </a:endParaRPr>
+                    </a:p>
+                  </a:txBody>
+                  <a:tcPr marL="50368" marR="50368" marT="0" marB="0" anchor="ctr">
+                    <a:lnL w="12700" cap="flat" cmpd="sng" algn="ctr">
+                      <a:solidFill>
+                        <a:srgbClr val="000000"/>
+                      </a:solidFill>
+                      <a:prstDash val="solid"/>
+                      <a:round/>
+                      <a:headEnd type="none" w="med" len="med"/>
+                      <a:tailEnd type="none" w="med" len="med"/>
+                    </a:lnL>
+                    <a:lnR w="12700" cap="flat" cmpd="sng" algn="ctr">
+                      <a:solidFill>
+                        <a:srgbClr val="000000"/>
+                      </a:solidFill>
+                      <a:prstDash val="solid"/>
+                      <a:round/>
+                      <a:headEnd type="none" w="med" len="med"/>
+                      <a:tailEnd type="none" w="med" len="med"/>
+                    </a:lnR>
+                    <a:lnT>
+                      <a:noFill/>
+                    </a:lnT>
+                    <a:lnB>
+                      <a:noFill/>
+                    </a:lnB>
+                  </a:tcPr>
+                </a:tc>
+                <a:tc>
+                  <a:txBody>
+                    <a:bodyPr/>
+                    <a:lstStyle/>
+                    <a:p>
+                      <a:pPr>
+                        <a:lnSpc>
+                          <a:spcPct val="115000"/>
+                        </a:lnSpc>
+                        <a:spcAft>
+                          <a:spcPts val="0"/>
+                        </a:spcAft>
+                      </a:pPr>
+                      <a:r>
+                        <a:rPr lang="es-GT" sz="2000">
+                          <a:solidFill>
+                            <a:srgbClr val="000000"/>
+                          </a:solidFill>
+                          <a:latin typeface="Calibri"/>
+                          <a:ea typeface="Times New Roman"/>
+                          <a:cs typeface="Calibri"/>
+                        </a:rPr>
+                        <a:t> - Información útil sobre el movimiento de productos del             inventario</a:t>
+                      </a:r>
+                      <a:endParaRPr lang="es-GT" sz="2000">
+                        <a:latin typeface="Calibri"/>
+                        <a:ea typeface="Calibri"/>
+                        <a:cs typeface="Times New Roman"/>
+                      </a:endParaRPr>
+                    </a:p>
+                  </a:txBody>
+                  <a:tcPr marL="50368" marR="50368" marT="0" marB="0" anchor="b">
+                    <a:lnL w="12700" cap="flat" cmpd="sng" algn="ctr">
+                      <a:solidFill>
+                        <a:srgbClr val="000000"/>
+                      </a:solidFill>
+                      <a:prstDash val="solid"/>
+                      <a:round/>
+                      <a:headEnd type="none" w="med" len="med"/>
+                      <a:tailEnd type="none" w="med" len="med"/>
+                    </a:lnL>
+                    <a:lnR w="12700" cap="flat" cmpd="sng" algn="ctr">
+                      <a:solidFill>
+                        <a:srgbClr val="000000"/>
+                      </a:solidFill>
+                      <a:prstDash val="solid"/>
+                      <a:round/>
+                      <a:headEnd type="none" w="med" len="med"/>
+                      <a:tailEnd type="none" w="med" len="med"/>
+                    </a:lnR>
+                    <a:lnT>
+                      <a:noFill/>
+                    </a:lnT>
+                    <a:lnB>
+                      <a:noFill/>
+                    </a:lnB>
+                  </a:tcPr>
+                </a:tc>
+              </a:tr>
+              <a:tr h="540887">
+                <a:tc>
+                  <a:txBody>
+                    <a:bodyPr/>
+                    <a:lstStyle/>
+                    <a:p>
+                      <a:pPr>
+                        <a:lnSpc>
+                          <a:spcPct val="115000"/>
+                        </a:lnSpc>
+                        <a:spcAft>
+                          <a:spcPts val="0"/>
+                        </a:spcAft>
+                      </a:pPr>
+                      <a:r>
+                        <a:rPr lang="es-GT" sz="2000">
+                          <a:solidFill>
+                            <a:srgbClr val="000000"/>
+                          </a:solidFill>
+                          <a:latin typeface="Calibri"/>
+                          <a:ea typeface="Times New Roman"/>
+                          <a:cs typeface="Calibri"/>
+                        </a:rPr>
+                        <a:t> - Capacitación a usuarios</a:t>
+                      </a:r>
+                      <a:endParaRPr lang="es-GT" sz="2000">
+                        <a:latin typeface="Calibri"/>
+                        <a:ea typeface="Calibri"/>
+                        <a:cs typeface="Times New Roman"/>
+                      </a:endParaRPr>
+                    </a:p>
+                  </a:txBody>
+                  <a:tcPr marL="50368" marR="50368" marT="0" marB="0" anchor="ctr">
+                    <a:lnL w="12700" cap="flat" cmpd="sng" algn="ctr">
+                      <a:solidFill>
+                        <a:srgbClr val="000000"/>
+                      </a:solidFill>
+                      <a:prstDash val="solid"/>
+                      <a:round/>
+                      <a:headEnd type="none" w="med" len="med"/>
+                      <a:tailEnd type="none" w="med" len="med"/>
+                    </a:lnL>
+                    <a:lnR w="12700" cap="flat" cmpd="sng" algn="ctr">
+                      <a:solidFill>
+                        <a:srgbClr val="000000"/>
+                      </a:solidFill>
+                      <a:prstDash val="solid"/>
+                      <a:round/>
+                      <a:headEnd type="none" w="med" len="med"/>
+                      <a:tailEnd type="none" w="med" len="med"/>
+                    </a:lnR>
+                    <a:lnT>
+                      <a:noFill/>
+                    </a:lnT>
+                    <a:lnB w="12700" cap="flat" cmpd="sng" algn="ctr">
+                      <a:solidFill>
+                        <a:srgbClr val="000000"/>
+                      </a:solidFill>
+                      <a:prstDash val="solid"/>
+                      <a:round/>
+                      <a:headEnd type="none" w="med" len="med"/>
+                      <a:tailEnd type="none" w="med" len="med"/>
+                    </a:lnB>
+                  </a:tcPr>
+                </a:tc>
+                <a:tc>
+                  <a:txBody>
+                    <a:bodyPr/>
+                    <a:lstStyle/>
+                    <a:p>
+                      <a:pPr>
+                        <a:lnSpc>
+                          <a:spcPct val="115000"/>
+                        </a:lnSpc>
+                        <a:spcAft>
+                          <a:spcPts val="0"/>
+                        </a:spcAft>
+                      </a:pPr>
+                      <a:r>
+                        <a:rPr lang="es-GT" sz="2000" dirty="0">
+                          <a:solidFill>
+                            <a:srgbClr val="000000"/>
+                          </a:solidFill>
+                          <a:latin typeface="Calibri"/>
+                          <a:ea typeface="Times New Roman"/>
+                          <a:cs typeface="Calibri"/>
+                        </a:rPr>
+                        <a:t> </a:t>
+                      </a:r>
+                      <a:endParaRPr lang="es-GT" sz="2000" dirty="0">
+                        <a:latin typeface="Calibri"/>
+                        <a:ea typeface="Calibri"/>
+                        <a:cs typeface="Times New Roman"/>
+                      </a:endParaRPr>
+                    </a:p>
+                  </a:txBody>
+                  <a:tcPr marL="50368" marR="50368" marT="0" marB="0" anchor="b">
+                    <a:lnL w="12700" cap="flat" cmpd="sng" algn="ctr">
+                      <a:solidFill>
+                        <a:srgbClr val="000000"/>
+                      </a:solidFill>
+                      <a:prstDash val="solid"/>
+                      <a:round/>
+                      <a:headEnd type="none" w="med" len="med"/>
+                      <a:tailEnd type="none" w="med" len="med"/>
+                    </a:lnL>
+                    <a:lnR w="12700" cap="flat" cmpd="sng" algn="ctr">
+                      <a:solidFill>
+                        <a:srgbClr val="000000"/>
+                      </a:solidFill>
+                      <a:prstDash val="solid"/>
+                      <a:round/>
+                      <a:headEnd type="none" w="med" len="med"/>
+                      <a:tailEnd type="none" w="med" len="med"/>
+                    </a:lnR>
+                    <a:lnT>
+                      <a:noFill/>
+                    </a:lnT>
+                    <a:lnB w="12700" cap="flat" cmpd="sng" algn="ctr">
+                      <a:solidFill>
+                        <a:srgbClr val="000000"/>
+                      </a:solidFill>
+                      <a:prstDash val="solid"/>
+                      <a:round/>
+                      <a:headEnd type="none" w="med" len="med"/>
+                      <a:tailEnd type="none" w="med" len="med"/>
+                    </a:lnB>
+                  </a:tcPr>
+                </a:tc>
+              </a:tr>
+            </a:tbl>
+          </a:graphicData>
+        </a:graphic>
+      </p:graphicFrame>
+      <p:pic>
+        <p:nvPicPr>
+          <p:cNvPr id="5" name="4 Imagen" descr="ICONO 1.jpg"/>
+          <p:cNvPicPr>
+            <a:picLocks noChangeAspect="1"/>
+          </p:cNvPicPr>
+          <p:nvPr/>
+        </p:nvPicPr>
+        <p:blipFill>
+          <a:blip r:embed="rId2"/>
+          <a:stretch>
+            <a:fillRect/>
+          </a:stretch>
+        </p:blipFill>
+        <p:spPr>
+          <a:xfrm>
+            <a:off x="7786710" y="5505248"/>
+            <a:ext cx="1357290" cy="1352751"/>
+          </a:xfrm>
+          <a:prstGeom prst="rect">
+            <a:avLst/>
+          </a:prstGeom>
+        </p:spPr>
+      </p:pic>
+    </p:spTree>
+  </p:cSld>
+  <p:clrMapOvr>
+    <a:masterClrMapping/>
+  </p:clrMapOvr>
 </p:sld>
 </file>
 

</xml_diff>

<commit_message>
Actualizada la presentación y el documento de la propuesta. Se agregó el pdf
</commit_message>
<xml_diff>
--- a/Propuesta (Doc y Diap)/Dattex-Plus.pptx
+++ b/Propuesta (Doc y Diap)/Dattex-Plus.pptx
@@ -22,7 +22,6 @@
     <p:sldId id="266" r:id="rId16"/>
     <p:sldId id="267" r:id="rId17"/>
     <p:sldId id="272" r:id="rId18"/>
-    <p:sldId id="273" r:id="rId19"/>
   </p:sldIdLst>
   <p:sldSz cx="9144000" cy="6858000" type="screen4x3"/>
   <p:notesSz cx="6858000" cy="9144000"/>
@@ -4241,7 +4240,7 @@
           <a:blip r:embed="rId3">
             <a:extLst>
               <a:ext uri="{28A0092B-C50C-407E-A947-70E740481C1C}">
-                <a14:useLocalDpi xmlns="" xmlns:a14="http://schemas.microsoft.com/office/drawing/2010/main" val="0"/>
+                <a14:useLocalDpi xmlns:a14="http://schemas.microsoft.com/office/drawing/2010/main" xmlns="" val="0"/>
               </a:ext>
             </a:extLst>
           </a:blip>
@@ -4263,14 +4262,14 @@
           <a:effectLst/>
           <a:extLst>
             <a:ext uri="{909E8E84-426E-40DD-AFC4-6F175D3DCCD1}">
-              <a14:hiddenFill xmlns="" xmlns:a14="http://schemas.microsoft.com/office/drawing/2010/main">
+              <a14:hiddenFill xmlns:a14="http://schemas.microsoft.com/office/drawing/2010/main" xmlns="">
                 <a:solidFill>
                   <a:schemeClr val="accent1"/>
                 </a:solidFill>
               </a14:hiddenFill>
             </a:ext>
             <a:ext uri="{91240B29-F687-4F45-9708-019B960494DF}">
-              <a14:hiddenLine xmlns="" xmlns:a14="http://schemas.microsoft.com/office/drawing/2010/main" w="9525">
+              <a14:hiddenLine xmlns:a14="http://schemas.microsoft.com/office/drawing/2010/main" xmlns="" w="9525">
                 <a:solidFill>
                   <a:schemeClr val="tx1"/>
                 </a:solidFill>
@@ -4280,7 +4279,7 @@
               </a14:hiddenLine>
             </a:ext>
             <a:ext uri="{AF507438-7753-43E0-B8FC-AC1667EBCBE1}">
-              <a14:hiddenEffects xmlns="" xmlns:a14="http://schemas.microsoft.com/office/drawing/2010/main">
+              <a14:hiddenEffects xmlns:a14="http://schemas.microsoft.com/office/drawing/2010/main" xmlns="">
                 <a:effectLst>
                   <a:outerShdw dist="35921" dir="2700000" algn="ctr" rotWithShape="0">
                     <a:schemeClr val="bg2"/>
@@ -4366,7 +4365,7 @@
           </a:ln>
           <a:extLst>
             <a:ext uri="{53640926-AAD7-44D8-BBD7-CCE9431645EC}">
-              <a14:shadowObscured xmlns="" xmlns:a14="http://schemas.microsoft.com/office/drawing/2010/main"/>
+              <a14:shadowObscured xmlns:a14="http://schemas.microsoft.com/office/drawing/2010/main" xmlns=""/>
             </a:ext>
           </a:extLst>
         </p:spPr>
@@ -4374,7 +4373,7 @@
     </p:spTree>
     <p:extLst>
       <p:ext uri="{BB962C8B-B14F-4D97-AF65-F5344CB8AC3E}">
-        <p14:creationId xmlns="" xmlns:p14="http://schemas.microsoft.com/office/powerpoint/2010/main" val="3901028638"/>
+        <p14:creationId xmlns:p14="http://schemas.microsoft.com/office/powerpoint/2010/main" xmlns="" val="3901028638"/>
       </p:ext>
     </p:extLst>
   </p:cSld>
@@ -4808,860 +4807,6 @@
           </a:p>
         </p:txBody>
       </p:sp>
-    </p:spTree>
-  </p:cSld>
-  <p:clrMapOvr>
-    <a:masterClrMapping/>
-  </p:clrMapOvr>
-</p:sld>
-</file>
-
-<file path=ppt/slides/slide18.xml><?xml version="1.0" encoding="utf-8"?>
-<p:sld xmlns:a="http://schemas.openxmlformats.org/drawingml/2006/main" xmlns:r="http://schemas.openxmlformats.org/officeDocument/2006/relationships" xmlns:p="http://schemas.openxmlformats.org/presentationml/2006/main">
-  <p:cSld>
-    <p:spTree>
-      <p:nvGrpSpPr>
-        <p:cNvPr id="1" name=""/>
-        <p:cNvGrpSpPr/>
-        <p:nvPr/>
-      </p:nvGrpSpPr>
-      <p:grpSpPr>
-        <a:xfrm>
-          <a:off x="0" y="0"/>
-          <a:ext cx="0" cy="0"/>
-          <a:chOff x="0" y="0"/>
-          <a:chExt cx="0" cy="0"/>
-        </a:xfrm>
-      </p:grpSpPr>
-      <p:sp>
-        <p:nvSpPr>
-          <p:cNvPr id="4" name="3 Título"/>
-          <p:cNvSpPr>
-            <a:spLocks noGrp="1"/>
-          </p:cNvSpPr>
-          <p:nvPr>
-            <p:ph type="title"/>
-          </p:nvPr>
-        </p:nvSpPr>
-        <p:spPr/>
-        <p:txBody>
-          <a:bodyPr/>
-          <a:lstStyle/>
-          <a:p>
-            <a:r>
-              <a:rPr lang="es-GT" dirty="0" smtClean="0"/>
-              <a:t>Análisis costo-beneficio</a:t>
-            </a:r>
-            <a:endParaRPr lang="es-GT" dirty="0"/>
-          </a:p>
-        </p:txBody>
-      </p:sp>
-      <p:graphicFrame>
-        <p:nvGraphicFramePr>
-          <p:cNvPr id="6" name="5 Marcador de contenido"/>
-          <p:cNvGraphicFramePr>
-            <a:graphicFrameLocks noGrp="1"/>
-          </p:cNvGraphicFramePr>
-          <p:nvPr>
-            <p:ph idx="1"/>
-          </p:nvPr>
-        </p:nvGraphicFramePr>
-        <p:xfrm>
-          <a:off x="383940" y="1857366"/>
-          <a:ext cx="8188588" cy="3946364"/>
-        </p:xfrm>
-        <a:graphic>
-          <a:graphicData uri="http://schemas.openxmlformats.org/drawingml/2006/table">
-            <a:tbl>
-              <a:tblPr/>
-              <a:tblGrid>
-                <a:gridCol w="2838469"/>
-                <a:gridCol w="5350119"/>
-              </a:tblGrid>
-              <a:tr h="540887">
-                <a:tc>
-                  <a:txBody>
-                    <a:bodyPr/>
-                    <a:lstStyle/>
-                    <a:p>
-                      <a:pPr algn="ctr">
-                        <a:lnSpc>
-                          <a:spcPct val="115000"/>
-                        </a:lnSpc>
-                        <a:spcAft>
-                          <a:spcPts val="0"/>
-                        </a:spcAft>
-                      </a:pPr>
-                      <a:r>
-                        <a:rPr lang="es-GT" sz="1600" b="1">
-                          <a:solidFill>
-                            <a:srgbClr val="000000"/>
-                          </a:solidFill>
-                          <a:latin typeface="Calibri"/>
-                          <a:ea typeface="Times New Roman"/>
-                          <a:cs typeface="Calibri"/>
-                        </a:rPr>
-                        <a:t>Costos del Sistema</a:t>
-                      </a:r>
-                      <a:endParaRPr lang="es-GT" sz="1200">
-                        <a:latin typeface="Calibri"/>
-                        <a:ea typeface="Calibri"/>
-                        <a:cs typeface="Times New Roman"/>
-                      </a:endParaRPr>
-                    </a:p>
-                  </a:txBody>
-                  <a:tcPr marL="50368" marR="50368" marT="0" marB="0" anchor="ctr">
-                    <a:lnL w="12700" cap="flat" cmpd="sng" algn="ctr">
-                      <a:solidFill>
-                        <a:srgbClr val="000000"/>
-                      </a:solidFill>
-                      <a:prstDash val="solid"/>
-                      <a:round/>
-                      <a:headEnd type="none" w="med" len="med"/>
-                      <a:tailEnd type="none" w="med" len="med"/>
-                    </a:lnL>
-                    <a:lnR w="12700" cap="flat" cmpd="sng" algn="ctr">
-                      <a:solidFill>
-                        <a:srgbClr val="000000"/>
-                      </a:solidFill>
-                      <a:prstDash val="solid"/>
-                      <a:round/>
-                      <a:headEnd type="none" w="med" len="med"/>
-                      <a:tailEnd type="none" w="med" len="med"/>
-                    </a:lnR>
-                    <a:lnT w="12700" cap="flat" cmpd="sng" algn="ctr">
-                      <a:solidFill>
-                        <a:srgbClr val="000000"/>
-                      </a:solidFill>
-                      <a:prstDash val="solid"/>
-                      <a:round/>
-                      <a:headEnd type="none" w="med" len="med"/>
-                      <a:tailEnd type="none" w="med" len="med"/>
-                    </a:lnT>
-                    <a:lnB w="12700" cap="flat" cmpd="sng" algn="ctr">
-                      <a:solidFill>
-                        <a:srgbClr val="000000"/>
-                      </a:solidFill>
-                      <a:prstDash val="solid"/>
-                      <a:round/>
-                      <a:headEnd type="none" w="med" len="med"/>
-                      <a:tailEnd type="none" w="med" len="med"/>
-                    </a:lnB>
-                  </a:tcPr>
-                </a:tc>
-                <a:tc>
-                  <a:txBody>
-                    <a:bodyPr/>
-                    <a:lstStyle/>
-                    <a:p>
-                      <a:pPr algn="ctr">
-                        <a:lnSpc>
-                          <a:spcPct val="115000"/>
-                        </a:lnSpc>
-                        <a:spcAft>
-                          <a:spcPts val="0"/>
-                        </a:spcAft>
-                      </a:pPr>
-                      <a:r>
-                        <a:rPr lang="es-GT" sz="1600" b="1">
-                          <a:solidFill>
-                            <a:srgbClr val="000000"/>
-                          </a:solidFill>
-                          <a:latin typeface="Calibri"/>
-                          <a:ea typeface="Times New Roman"/>
-                          <a:cs typeface="Calibri"/>
-                        </a:rPr>
-                        <a:t>Beneficios del Sistema</a:t>
-                      </a:r>
-                      <a:endParaRPr lang="es-GT" sz="1200">
-                        <a:latin typeface="Calibri"/>
-                        <a:ea typeface="Calibri"/>
-                        <a:cs typeface="Times New Roman"/>
-                      </a:endParaRPr>
-                    </a:p>
-                  </a:txBody>
-                  <a:tcPr marL="50368" marR="50368" marT="0" marB="0" anchor="ctr">
-                    <a:lnL w="12700" cap="flat" cmpd="sng" algn="ctr">
-                      <a:solidFill>
-                        <a:srgbClr val="000000"/>
-                      </a:solidFill>
-                      <a:prstDash val="solid"/>
-                      <a:round/>
-                      <a:headEnd type="none" w="med" len="med"/>
-                      <a:tailEnd type="none" w="med" len="med"/>
-                    </a:lnL>
-                    <a:lnR w="12700" cap="flat" cmpd="sng" algn="ctr">
-                      <a:solidFill>
-                        <a:srgbClr val="000000"/>
-                      </a:solidFill>
-                      <a:prstDash val="solid"/>
-                      <a:round/>
-                      <a:headEnd type="none" w="med" len="med"/>
-                      <a:tailEnd type="none" w="med" len="med"/>
-                    </a:lnR>
-                    <a:lnT w="12700" cap="flat" cmpd="sng" algn="ctr">
-                      <a:solidFill>
-                        <a:srgbClr val="000000"/>
-                      </a:solidFill>
-                      <a:prstDash val="solid"/>
-                      <a:round/>
-                      <a:headEnd type="none" w="med" len="med"/>
-                      <a:tailEnd type="none" w="med" len="med"/>
-                    </a:lnT>
-                    <a:lnB w="12700" cap="flat" cmpd="sng" algn="ctr">
-                      <a:solidFill>
-                        <a:srgbClr val="000000"/>
-                      </a:solidFill>
-                      <a:prstDash val="solid"/>
-                      <a:round/>
-                      <a:headEnd type="none" w="med" len="med"/>
-                      <a:tailEnd type="none" w="med" len="med"/>
-                    </a:lnB>
-                  </a:tcPr>
-                </a:tc>
-              </a:tr>
-              <a:tr h="540887">
-                <a:tc>
-                  <a:txBody>
-                    <a:bodyPr/>
-                    <a:lstStyle/>
-                    <a:p>
-                      <a:pPr>
-                        <a:lnSpc>
-                          <a:spcPct val="115000"/>
-                        </a:lnSpc>
-                        <a:spcAft>
-                          <a:spcPts val="0"/>
-                        </a:spcAft>
-                      </a:pPr>
-                      <a:r>
-                        <a:rPr lang="es-GT" sz="2000">
-                          <a:solidFill>
-                            <a:srgbClr val="000000"/>
-                          </a:solidFill>
-                          <a:latin typeface="Calibri"/>
-                          <a:ea typeface="Times New Roman"/>
-                          <a:cs typeface="Calibri"/>
-                        </a:rPr>
-                        <a:t> - Compra de equipo</a:t>
-                      </a:r>
-                      <a:endParaRPr lang="es-GT" sz="2000">
-                        <a:latin typeface="Calibri"/>
-                        <a:ea typeface="Calibri"/>
-                        <a:cs typeface="Times New Roman"/>
-                      </a:endParaRPr>
-                    </a:p>
-                  </a:txBody>
-                  <a:tcPr marL="50368" marR="50368" marT="0" marB="0" anchor="ctr">
-                    <a:lnL w="12700" cap="flat" cmpd="sng" algn="ctr">
-                      <a:solidFill>
-                        <a:srgbClr val="000000"/>
-                      </a:solidFill>
-                      <a:prstDash val="solid"/>
-                      <a:round/>
-                      <a:headEnd type="none" w="med" len="med"/>
-                      <a:tailEnd type="none" w="med" len="med"/>
-                    </a:lnL>
-                    <a:lnR w="12700" cap="flat" cmpd="sng" algn="ctr">
-                      <a:solidFill>
-                        <a:srgbClr val="000000"/>
-                      </a:solidFill>
-                      <a:prstDash val="solid"/>
-                      <a:round/>
-                      <a:headEnd type="none" w="med" len="med"/>
-                      <a:tailEnd type="none" w="med" len="med"/>
-                    </a:lnR>
-                    <a:lnT w="12700" cap="flat" cmpd="sng" algn="ctr">
-                      <a:solidFill>
-                        <a:srgbClr val="000000"/>
-                      </a:solidFill>
-                      <a:prstDash val="solid"/>
-                      <a:round/>
-                      <a:headEnd type="none" w="med" len="med"/>
-                      <a:tailEnd type="none" w="med" len="med"/>
-                    </a:lnT>
-                    <a:lnB>
-                      <a:noFill/>
-                    </a:lnB>
-                  </a:tcPr>
-                </a:tc>
-                <a:tc>
-                  <a:txBody>
-                    <a:bodyPr/>
-                    <a:lstStyle/>
-                    <a:p>
-                      <a:pPr>
-                        <a:lnSpc>
-                          <a:spcPct val="115000"/>
-                        </a:lnSpc>
-                        <a:spcAft>
-                          <a:spcPts val="0"/>
-                        </a:spcAft>
-                      </a:pPr>
-                      <a:r>
-                        <a:rPr lang="es-GT" sz="2000">
-                          <a:solidFill>
-                            <a:srgbClr val="000000"/>
-                          </a:solidFill>
-                          <a:latin typeface="Calibri"/>
-                          <a:ea typeface="Times New Roman"/>
-                          <a:cs typeface="Calibri"/>
-                        </a:rPr>
-                        <a:t> - Aumento en utilidades al tener una mejor organización</a:t>
-                      </a:r>
-                      <a:endParaRPr lang="es-GT" sz="2000">
-                        <a:latin typeface="Calibri"/>
-                        <a:ea typeface="Calibri"/>
-                        <a:cs typeface="Times New Roman"/>
-                      </a:endParaRPr>
-                    </a:p>
-                  </a:txBody>
-                  <a:tcPr marL="50368" marR="50368" marT="0" marB="0" anchor="b">
-                    <a:lnL w="12700" cap="flat" cmpd="sng" algn="ctr">
-                      <a:solidFill>
-                        <a:srgbClr val="000000"/>
-                      </a:solidFill>
-                      <a:prstDash val="solid"/>
-                      <a:round/>
-                      <a:headEnd type="none" w="med" len="med"/>
-                      <a:tailEnd type="none" w="med" len="med"/>
-                    </a:lnL>
-                    <a:lnR w="12700" cap="flat" cmpd="sng" algn="ctr">
-                      <a:solidFill>
-                        <a:srgbClr val="000000"/>
-                      </a:solidFill>
-                      <a:prstDash val="solid"/>
-                      <a:round/>
-                      <a:headEnd type="none" w="med" len="med"/>
-                      <a:tailEnd type="none" w="med" len="med"/>
-                    </a:lnR>
-                    <a:lnT w="12700" cap="flat" cmpd="sng" algn="ctr">
-                      <a:solidFill>
-                        <a:srgbClr val="000000"/>
-                      </a:solidFill>
-                      <a:prstDash val="solid"/>
-                      <a:round/>
-                      <a:headEnd type="none" w="med" len="med"/>
-                      <a:tailEnd type="none" w="med" len="med"/>
-                    </a:lnT>
-                    <a:lnB>
-                      <a:noFill/>
-                    </a:lnB>
-                  </a:tcPr>
-                </a:tc>
-              </a:tr>
-              <a:tr h="540887">
-                <a:tc>
-                  <a:txBody>
-                    <a:bodyPr/>
-                    <a:lstStyle/>
-                    <a:p>
-                      <a:pPr>
-                        <a:lnSpc>
-                          <a:spcPct val="115000"/>
-                        </a:lnSpc>
-                        <a:spcAft>
-                          <a:spcPts val="0"/>
-                        </a:spcAft>
-                      </a:pPr>
-                      <a:r>
-                        <a:rPr lang="es-GT" sz="2000">
-                          <a:solidFill>
-                            <a:srgbClr val="000000"/>
-                          </a:solidFill>
-                          <a:latin typeface="Calibri"/>
-                          <a:ea typeface="Times New Roman"/>
-                          <a:cs typeface="Calibri"/>
-                        </a:rPr>
-                        <a:t> - Instalación de equipo</a:t>
-                      </a:r>
-                      <a:endParaRPr lang="es-GT" sz="2000">
-                        <a:latin typeface="Calibri"/>
-                        <a:ea typeface="Calibri"/>
-                        <a:cs typeface="Times New Roman"/>
-                      </a:endParaRPr>
-                    </a:p>
-                  </a:txBody>
-                  <a:tcPr marL="50368" marR="50368" marT="0" marB="0" anchor="ctr">
-                    <a:lnL w="12700" cap="flat" cmpd="sng" algn="ctr">
-                      <a:solidFill>
-                        <a:srgbClr val="000000"/>
-                      </a:solidFill>
-                      <a:prstDash val="solid"/>
-                      <a:round/>
-                      <a:headEnd type="none" w="med" len="med"/>
-                      <a:tailEnd type="none" w="med" len="med"/>
-                    </a:lnL>
-                    <a:lnR w="12700" cap="flat" cmpd="sng" algn="ctr">
-                      <a:solidFill>
-                        <a:srgbClr val="000000"/>
-                      </a:solidFill>
-                      <a:prstDash val="solid"/>
-                      <a:round/>
-                      <a:headEnd type="none" w="med" len="med"/>
-                      <a:tailEnd type="none" w="med" len="med"/>
-                    </a:lnR>
-                    <a:lnT>
-                      <a:noFill/>
-                    </a:lnT>
-                    <a:lnB>
-                      <a:noFill/>
-                    </a:lnB>
-                  </a:tcPr>
-                </a:tc>
-                <a:tc>
-                  <a:txBody>
-                    <a:bodyPr/>
-                    <a:lstStyle/>
-                    <a:p>
-                      <a:pPr>
-                        <a:lnSpc>
-                          <a:spcPct val="115000"/>
-                        </a:lnSpc>
-                        <a:spcAft>
-                          <a:spcPts val="0"/>
-                        </a:spcAft>
-                      </a:pPr>
-                      <a:r>
-                        <a:rPr lang="es-GT" sz="2000">
-                          <a:solidFill>
-                            <a:srgbClr val="000000"/>
-                          </a:solidFill>
-                          <a:latin typeface="Calibri"/>
-                          <a:ea typeface="Times New Roman"/>
-                          <a:cs typeface="Calibri"/>
-                        </a:rPr>
-                        <a:t> - Mejora en la administración de personal</a:t>
-                      </a:r>
-                      <a:endParaRPr lang="es-GT" sz="2000">
-                        <a:latin typeface="Calibri"/>
-                        <a:ea typeface="Calibri"/>
-                        <a:cs typeface="Times New Roman"/>
-                      </a:endParaRPr>
-                    </a:p>
-                  </a:txBody>
-                  <a:tcPr marL="50368" marR="50368" marT="0" marB="0" anchor="b">
-                    <a:lnL w="12700" cap="flat" cmpd="sng" algn="ctr">
-                      <a:solidFill>
-                        <a:srgbClr val="000000"/>
-                      </a:solidFill>
-                      <a:prstDash val="solid"/>
-                      <a:round/>
-                      <a:headEnd type="none" w="med" len="med"/>
-                      <a:tailEnd type="none" w="med" len="med"/>
-                    </a:lnL>
-                    <a:lnR w="12700" cap="flat" cmpd="sng" algn="ctr">
-                      <a:solidFill>
-                        <a:srgbClr val="000000"/>
-                      </a:solidFill>
-                      <a:prstDash val="solid"/>
-                      <a:round/>
-                      <a:headEnd type="none" w="med" len="med"/>
-                      <a:tailEnd type="none" w="med" len="med"/>
-                    </a:lnR>
-                    <a:lnT>
-                      <a:noFill/>
-                    </a:lnT>
-                    <a:lnB>
-                      <a:noFill/>
-                    </a:lnB>
-                  </a:tcPr>
-                </a:tc>
-              </a:tr>
-              <a:tr h="540887">
-                <a:tc>
-                  <a:txBody>
-                    <a:bodyPr/>
-                    <a:lstStyle/>
-                    <a:p>
-                      <a:pPr>
-                        <a:lnSpc>
-                          <a:spcPct val="115000"/>
-                        </a:lnSpc>
-                        <a:spcAft>
-                          <a:spcPts val="0"/>
-                        </a:spcAft>
-                      </a:pPr>
-                      <a:r>
-                        <a:rPr lang="es-GT" sz="2000">
-                          <a:solidFill>
-                            <a:srgbClr val="000000"/>
-                          </a:solidFill>
-                          <a:latin typeface="Calibri"/>
-                          <a:ea typeface="Times New Roman"/>
-                          <a:cs typeface="Calibri"/>
-                        </a:rPr>
-                        <a:t> - Compra del software</a:t>
-                      </a:r>
-                      <a:endParaRPr lang="es-GT" sz="2000">
-                        <a:latin typeface="Calibri"/>
-                        <a:ea typeface="Calibri"/>
-                        <a:cs typeface="Times New Roman"/>
-                      </a:endParaRPr>
-                    </a:p>
-                  </a:txBody>
-                  <a:tcPr marL="50368" marR="50368" marT="0" marB="0" anchor="ctr">
-                    <a:lnL w="12700" cap="flat" cmpd="sng" algn="ctr">
-                      <a:solidFill>
-                        <a:srgbClr val="000000"/>
-                      </a:solidFill>
-                      <a:prstDash val="solid"/>
-                      <a:round/>
-                      <a:headEnd type="none" w="med" len="med"/>
-                      <a:tailEnd type="none" w="med" len="med"/>
-                    </a:lnL>
-                    <a:lnR w="12700" cap="flat" cmpd="sng" algn="ctr">
-                      <a:solidFill>
-                        <a:srgbClr val="000000"/>
-                      </a:solidFill>
-                      <a:prstDash val="solid"/>
-                      <a:round/>
-                      <a:headEnd type="none" w="med" len="med"/>
-                      <a:tailEnd type="none" w="med" len="med"/>
-                    </a:lnR>
-                    <a:lnT>
-                      <a:noFill/>
-                    </a:lnT>
-                    <a:lnB>
-                      <a:noFill/>
-                    </a:lnB>
-                  </a:tcPr>
-                </a:tc>
-                <a:tc>
-                  <a:txBody>
-                    <a:bodyPr/>
-                    <a:lstStyle/>
-                    <a:p>
-                      <a:pPr>
-                        <a:lnSpc>
-                          <a:spcPct val="115000"/>
-                        </a:lnSpc>
-                        <a:spcAft>
-                          <a:spcPts val="0"/>
-                        </a:spcAft>
-                      </a:pPr>
-                      <a:r>
-                        <a:rPr lang="es-GT" sz="2000">
-                          <a:solidFill>
-                            <a:srgbClr val="000000"/>
-                          </a:solidFill>
-                          <a:latin typeface="Calibri"/>
-                          <a:ea typeface="Times New Roman"/>
-                          <a:cs typeface="Calibri"/>
-                        </a:rPr>
-                        <a:t> - Organización y control preciso del inventario</a:t>
-                      </a:r>
-                      <a:endParaRPr lang="es-GT" sz="2000">
-                        <a:latin typeface="Calibri"/>
-                        <a:ea typeface="Calibri"/>
-                        <a:cs typeface="Times New Roman"/>
-                      </a:endParaRPr>
-                    </a:p>
-                  </a:txBody>
-                  <a:tcPr marL="50368" marR="50368" marT="0" marB="0" anchor="b">
-                    <a:lnL w="12700" cap="flat" cmpd="sng" algn="ctr">
-                      <a:solidFill>
-                        <a:srgbClr val="000000"/>
-                      </a:solidFill>
-                      <a:prstDash val="solid"/>
-                      <a:round/>
-                      <a:headEnd type="none" w="med" len="med"/>
-                      <a:tailEnd type="none" w="med" len="med"/>
-                    </a:lnL>
-                    <a:lnR w="12700" cap="flat" cmpd="sng" algn="ctr">
-                      <a:solidFill>
-                        <a:srgbClr val="000000"/>
-                      </a:solidFill>
-                      <a:prstDash val="solid"/>
-                      <a:round/>
-                      <a:headEnd type="none" w="med" len="med"/>
-                      <a:tailEnd type="none" w="med" len="med"/>
-                    </a:lnR>
-                    <a:lnT>
-                      <a:noFill/>
-                    </a:lnT>
-                    <a:lnB>
-                      <a:noFill/>
-                    </a:lnB>
-                  </a:tcPr>
-                </a:tc>
-              </a:tr>
-              <a:tr h="1081776">
-                <a:tc>
-                  <a:txBody>
-                    <a:bodyPr/>
-                    <a:lstStyle/>
-                    <a:p>
-                      <a:pPr>
-                        <a:lnSpc>
-                          <a:spcPct val="115000"/>
-                        </a:lnSpc>
-                        <a:spcAft>
-                          <a:spcPts val="0"/>
-                        </a:spcAft>
-                      </a:pPr>
-                      <a:r>
-                        <a:rPr lang="es-GT" sz="2000">
-                          <a:solidFill>
-                            <a:srgbClr val="000000"/>
-                          </a:solidFill>
-                          <a:latin typeface="Calibri"/>
-                          <a:ea typeface="Times New Roman"/>
-                          <a:cs typeface="Calibri"/>
-                        </a:rPr>
-                        <a:t> - Mantenimiento de software</a:t>
-                      </a:r>
-                      <a:endParaRPr lang="es-GT" sz="2000">
-                        <a:latin typeface="Calibri"/>
-                        <a:ea typeface="Calibri"/>
-                        <a:cs typeface="Times New Roman"/>
-                      </a:endParaRPr>
-                    </a:p>
-                  </a:txBody>
-                  <a:tcPr marL="50368" marR="50368" marT="0" marB="0" anchor="ctr">
-                    <a:lnL w="12700" cap="flat" cmpd="sng" algn="ctr">
-                      <a:solidFill>
-                        <a:srgbClr val="000000"/>
-                      </a:solidFill>
-                      <a:prstDash val="solid"/>
-                      <a:round/>
-                      <a:headEnd type="none" w="med" len="med"/>
-                      <a:tailEnd type="none" w="med" len="med"/>
-                    </a:lnL>
-                    <a:lnR w="12700" cap="flat" cmpd="sng" algn="ctr">
-                      <a:solidFill>
-                        <a:srgbClr val="000000"/>
-                      </a:solidFill>
-                      <a:prstDash val="solid"/>
-                      <a:round/>
-                      <a:headEnd type="none" w="med" len="med"/>
-                      <a:tailEnd type="none" w="med" len="med"/>
-                    </a:lnR>
-                    <a:lnT>
-                      <a:noFill/>
-                    </a:lnT>
-                    <a:lnB>
-                      <a:noFill/>
-                    </a:lnB>
-                  </a:tcPr>
-                </a:tc>
-                <a:tc>
-                  <a:txBody>
-                    <a:bodyPr/>
-                    <a:lstStyle/>
-                    <a:p>
-                      <a:pPr>
-                        <a:lnSpc>
-                          <a:spcPct val="115000"/>
-                        </a:lnSpc>
-                        <a:spcAft>
-                          <a:spcPts val="0"/>
-                        </a:spcAft>
-                      </a:pPr>
-                      <a:r>
-                        <a:rPr lang="es-GT" sz="2000">
-                          <a:solidFill>
-                            <a:srgbClr val="000000"/>
-                          </a:solidFill>
-                          <a:latin typeface="Calibri"/>
-                          <a:ea typeface="Times New Roman"/>
-                          <a:cs typeface="Calibri"/>
-                        </a:rPr>
-                        <a:t> - Información útil sobre el movimiento de productos del             inventario</a:t>
-                      </a:r>
-                      <a:endParaRPr lang="es-GT" sz="2000">
-                        <a:latin typeface="Calibri"/>
-                        <a:ea typeface="Calibri"/>
-                        <a:cs typeface="Times New Roman"/>
-                      </a:endParaRPr>
-                    </a:p>
-                  </a:txBody>
-                  <a:tcPr marL="50368" marR="50368" marT="0" marB="0" anchor="b">
-                    <a:lnL w="12700" cap="flat" cmpd="sng" algn="ctr">
-                      <a:solidFill>
-                        <a:srgbClr val="000000"/>
-                      </a:solidFill>
-                      <a:prstDash val="solid"/>
-                      <a:round/>
-                      <a:headEnd type="none" w="med" len="med"/>
-                      <a:tailEnd type="none" w="med" len="med"/>
-                    </a:lnL>
-                    <a:lnR w="12700" cap="flat" cmpd="sng" algn="ctr">
-                      <a:solidFill>
-                        <a:srgbClr val="000000"/>
-                      </a:solidFill>
-                      <a:prstDash val="solid"/>
-                      <a:round/>
-                      <a:headEnd type="none" w="med" len="med"/>
-                      <a:tailEnd type="none" w="med" len="med"/>
-                    </a:lnR>
-                    <a:lnT>
-                      <a:noFill/>
-                    </a:lnT>
-                    <a:lnB>
-                      <a:noFill/>
-                    </a:lnB>
-                  </a:tcPr>
-                </a:tc>
-              </a:tr>
-              <a:tr h="540887">
-                <a:tc>
-                  <a:txBody>
-                    <a:bodyPr/>
-                    <a:lstStyle/>
-                    <a:p>
-                      <a:pPr>
-                        <a:lnSpc>
-                          <a:spcPct val="115000"/>
-                        </a:lnSpc>
-                        <a:spcAft>
-                          <a:spcPts val="0"/>
-                        </a:spcAft>
-                      </a:pPr>
-                      <a:r>
-                        <a:rPr lang="es-GT" sz="2000">
-                          <a:solidFill>
-                            <a:srgbClr val="000000"/>
-                          </a:solidFill>
-                          <a:latin typeface="Calibri"/>
-                          <a:ea typeface="Times New Roman"/>
-                          <a:cs typeface="Calibri"/>
-                        </a:rPr>
-                        <a:t> - Capacitación a usuarios</a:t>
-                      </a:r>
-                      <a:endParaRPr lang="es-GT" sz="2000">
-                        <a:latin typeface="Calibri"/>
-                        <a:ea typeface="Calibri"/>
-                        <a:cs typeface="Times New Roman"/>
-                      </a:endParaRPr>
-                    </a:p>
-                  </a:txBody>
-                  <a:tcPr marL="50368" marR="50368" marT="0" marB="0" anchor="ctr">
-                    <a:lnL w="12700" cap="flat" cmpd="sng" algn="ctr">
-                      <a:solidFill>
-                        <a:srgbClr val="000000"/>
-                      </a:solidFill>
-                      <a:prstDash val="solid"/>
-                      <a:round/>
-                      <a:headEnd type="none" w="med" len="med"/>
-                      <a:tailEnd type="none" w="med" len="med"/>
-                    </a:lnL>
-                    <a:lnR w="12700" cap="flat" cmpd="sng" algn="ctr">
-                      <a:solidFill>
-                        <a:srgbClr val="000000"/>
-                      </a:solidFill>
-                      <a:prstDash val="solid"/>
-                      <a:round/>
-                      <a:headEnd type="none" w="med" len="med"/>
-                      <a:tailEnd type="none" w="med" len="med"/>
-                    </a:lnR>
-                    <a:lnT>
-                      <a:noFill/>
-                    </a:lnT>
-                    <a:lnB w="12700" cap="flat" cmpd="sng" algn="ctr">
-                      <a:solidFill>
-                        <a:srgbClr val="000000"/>
-                      </a:solidFill>
-                      <a:prstDash val="solid"/>
-                      <a:round/>
-                      <a:headEnd type="none" w="med" len="med"/>
-                      <a:tailEnd type="none" w="med" len="med"/>
-                    </a:lnB>
-                  </a:tcPr>
-                </a:tc>
-                <a:tc>
-                  <a:txBody>
-                    <a:bodyPr/>
-                    <a:lstStyle/>
-                    <a:p>
-                      <a:pPr>
-                        <a:lnSpc>
-                          <a:spcPct val="115000"/>
-                        </a:lnSpc>
-                        <a:spcAft>
-                          <a:spcPts val="0"/>
-                        </a:spcAft>
-                      </a:pPr>
-                      <a:r>
-                        <a:rPr lang="es-GT" sz="2000" dirty="0">
-                          <a:solidFill>
-                            <a:srgbClr val="000000"/>
-                          </a:solidFill>
-                          <a:latin typeface="Calibri"/>
-                          <a:ea typeface="Times New Roman"/>
-                          <a:cs typeface="Calibri"/>
-                        </a:rPr>
-                        <a:t> </a:t>
-                      </a:r>
-                      <a:endParaRPr lang="es-GT" sz="2000" dirty="0">
-                        <a:latin typeface="Calibri"/>
-                        <a:ea typeface="Calibri"/>
-                        <a:cs typeface="Times New Roman"/>
-                      </a:endParaRPr>
-                    </a:p>
-                  </a:txBody>
-                  <a:tcPr marL="50368" marR="50368" marT="0" marB="0" anchor="b">
-                    <a:lnL w="12700" cap="flat" cmpd="sng" algn="ctr">
-                      <a:solidFill>
-                        <a:srgbClr val="000000"/>
-                      </a:solidFill>
-                      <a:prstDash val="solid"/>
-                      <a:round/>
-                      <a:headEnd type="none" w="med" len="med"/>
-                      <a:tailEnd type="none" w="med" len="med"/>
-                    </a:lnL>
-                    <a:lnR w="12700" cap="flat" cmpd="sng" algn="ctr">
-                      <a:solidFill>
-                        <a:srgbClr val="000000"/>
-                      </a:solidFill>
-                      <a:prstDash val="solid"/>
-                      <a:round/>
-                      <a:headEnd type="none" w="med" len="med"/>
-                      <a:tailEnd type="none" w="med" len="med"/>
-                    </a:lnR>
-                    <a:lnT>
-                      <a:noFill/>
-                    </a:lnT>
-                    <a:lnB w="12700" cap="flat" cmpd="sng" algn="ctr">
-                      <a:solidFill>
-                        <a:srgbClr val="000000"/>
-                      </a:solidFill>
-                      <a:prstDash val="solid"/>
-                      <a:round/>
-                      <a:headEnd type="none" w="med" len="med"/>
-                      <a:tailEnd type="none" w="med" len="med"/>
-                    </a:lnB>
-                  </a:tcPr>
-                </a:tc>
-              </a:tr>
-            </a:tbl>
-          </a:graphicData>
-        </a:graphic>
-      </p:graphicFrame>
-      <p:pic>
-        <p:nvPicPr>
-          <p:cNvPr id="5" name="4 Imagen" descr="ICONO 1.jpg"/>
-          <p:cNvPicPr>
-            <a:picLocks noChangeAspect="1"/>
-          </p:cNvPicPr>
-          <p:nvPr/>
-        </p:nvPicPr>
-        <p:blipFill>
-          <a:blip r:embed="rId2"/>
-          <a:stretch>
-            <a:fillRect/>
-          </a:stretch>
-        </p:blipFill>
-        <p:spPr>
-          <a:xfrm>
-            <a:off x="7786710" y="5505248"/>
-            <a:ext cx="1357290" cy="1352751"/>
-          </a:xfrm>
-          <a:prstGeom prst="rect">
-            <a:avLst/>
-          </a:prstGeom>
-        </p:spPr>
-      </p:pic>
     </p:spTree>
   </p:cSld>
   <p:clrMapOvr>

</xml_diff>

<commit_message>
Actualizada la presentación, se agregó la tabla de implementación
</commit_message>
<xml_diff>
--- a/Propuesta (Doc y Diap)/Dattex-Plus.pptx
+++ b/Propuesta (Doc y Diap)/Dattex-Plus.pptx
@@ -21,7 +21,8 @@
     <p:sldId id="264" r:id="rId15"/>
     <p:sldId id="266" r:id="rId16"/>
     <p:sldId id="267" r:id="rId17"/>
-    <p:sldId id="272" r:id="rId18"/>
+    <p:sldId id="273" r:id="rId18"/>
+    <p:sldId id="272" r:id="rId19"/>
   </p:sldIdLst>
   <p:sldSz cx="9144000" cy="6858000" type="screen4x3"/>
   <p:notesSz cx="6858000" cy="9144000"/>
@@ -4240,7 +4241,7 @@
           <a:blip r:embed="rId3">
             <a:extLst>
               <a:ext uri="{28A0092B-C50C-407E-A947-70E740481C1C}">
-                <a14:useLocalDpi xmlns:a14="http://schemas.microsoft.com/office/drawing/2010/main" xmlns="" val="0"/>
+                <a14:useLocalDpi xmlns="" xmlns:a14="http://schemas.microsoft.com/office/drawing/2010/main" val="0"/>
               </a:ext>
             </a:extLst>
           </a:blip>
@@ -4262,14 +4263,14 @@
           <a:effectLst/>
           <a:extLst>
             <a:ext uri="{909E8E84-426E-40DD-AFC4-6F175D3DCCD1}">
-              <a14:hiddenFill xmlns:a14="http://schemas.microsoft.com/office/drawing/2010/main" xmlns="">
+              <a14:hiddenFill xmlns="" xmlns:a14="http://schemas.microsoft.com/office/drawing/2010/main">
                 <a:solidFill>
                   <a:schemeClr val="accent1"/>
                 </a:solidFill>
               </a14:hiddenFill>
             </a:ext>
             <a:ext uri="{91240B29-F687-4F45-9708-019B960494DF}">
-              <a14:hiddenLine xmlns:a14="http://schemas.microsoft.com/office/drawing/2010/main" xmlns="" w="9525">
+              <a14:hiddenLine xmlns="" xmlns:a14="http://schemas.microsoft.com/office/drawing/2010/main" w="9525">
                 <a:solidFill>
                   <a:schemeClr val="tx1"/>
                 </a:solidFill>
@@ -4279,7 +4280,7 @@
               </a14:hiddenLine>
             </a:ext>
             <a:ext uri="{AF507438-7753-43E0-B8FC-AC1667EBCBE1}">
-              <a14:hiddenEffects xmlns:a14="http://schemas.microsoft.com/office/drawing/2010/main" xmlns="">
+              <a14:hiddenEffects xmlns="" xmlns:a14="http://schemas.microsoft.com/office/drawing/2010/main">
                 <a:effectLst>
                   <a:outerShdw dist="35921" dir="2700000" algn="ctr" rotWithShape="0">
                     <a:schemeClr val="bg2"/>
@@ -4365,7 +4366,7 @@
           </a:ln>
           <a:extLst>
             <a:ext uri="{53640926-AAD7-44D8-BBD7-CCE9431645EC}">
-              <a14:shadowObscured xmlns:a14="http://schemas.microsoft.com/office/drawing/2010/main" xmlns=""/>
+              <a14:shadowObscured xmlns="" xmlns:a14="http://schemas.microsoft.com/office/drawing/2010/main"/>
             </a:ext>
           </a:extLst>
         </p:spPr>
@@ -4373,7 +4374,7 @@
     </p:spTree>
     <p:extLst>
       <p:ext uri="{BB962C8B-B14F-4D97-AF65-F5344CB8AC3E}">
-        <p14:creationId xmlns:p14="http://schemas.microsoft.com/office/powerpoint/2010/main" xmlns="" val="3901028638"/>
+        <p14:creationId xmlns="" xmlns:p14="http://schemas.microsoft.com/office/powerpoint/2010/main" val="3901028638"/>
       </p:ext>
     </p:extLst>
   </p:cSld>
@@ -4749,6 +4750,1270 @@
 </file>
 
 <file path=ppt/slides/slide17.xml><?xml version="1.0" encoding="utf-8"?>
+<p:sld xmlns:a="http://schemas.openxmlformats.org/drawingml/2006/main" xmlns:r="http://schemas.openxmlformats.org/officeDocument/2006/relationships" xmlns:p="http://schemas.openxmlformats.org/presentationml/2006/main">
+  <p:cSld>
+    <p:spTree>
+      <p:nvGrpSpPr>
+        <p:cNvPr id="1" name=""/>
+        <p:cNvGrpSpPr/>
+        <p:nvPr/>
+      </p:nvGrpSpPr>
+      <p:grpSpPr>
+        <a:xfrm>
+          <a:off x="0" y="0"/>
+          <a:ext cx="0" cy="0"/>
+          <a:chOff x="0" y="0"/>
+          <a:chExt cx="0" cy="0"/>
+        </a:xfrm>
+      </p:grpSpPr>
+      <p:sp>
+        <p:nvSpPr>
+          <p:cNvPr id="2" name="1 Título"/>
+          <p:cNvSpPr>
+            <a:spLocks noGrp="1"/>
+          </p:cNvSpPr>
+          <p:nvPr>
+            <p:ph type="title"/>
+          </p:nvPr>
+        </p:nvSpPr>
+        <p:spPr/>
+        <p:txBody>
+          <a:bodyPr/>
+          <a:lstStyle/>
+          <a:p>
+            <a:endParaRPr lang="es-GT"/>
+          </a:p>
+        </p:txBody>
+      </p:sp>
+      <p:graphicFrame>
+        <p:nvGraphicFramePr>
+          <p:cNvPr id="4" name="3 Marcador de contenido"/>
+          <p:cNvGraphicFramePr>
+            <a:graphicFrameLocks noGrp="1"/>
+          </p:cNvGraphicFramePr>
+          <p:nvPr>
+            <p:ph idx="1"/>
+          </p:nvPr>
+        </p:nvGraphicFramePr>
+        <p:xfrm>
+          <a:off x="291384" y="1643052"/>
+          <a:ext cx="8630741" cy="4929217"/>
+        </p:xfrm>
+        <a:graphic>
+          <a:graphicData uri="http://schemas.openxmlformats.org/drawingml/2006/table">
+            <a:tbl>
+              <a:tblPr/>
+              <a:tblGrid>
+                <a:gridCol w="3241771"/>
+                <a:gridCol w="5388970"/>
+              </a:tblGrid>
+              <a:tr h="410768">
+                <a:tc>
+                  <a:txBody>
+                    <a:bodyPr/>
+                    <a:lstStyle/>
+                    <a:p>
+                      <a:pPr algn="ctr">
+                        <a:lnSpc>
+                          <a:spcPct val="115000"/>
+                        </a:lnSpc>
+                        <a:spcAft>
+                          <a:spcPts val="0"/>
+                        </a:spcAft>
+                      </a:pPr>
+                      <a:r>
+                        <a:rPr lang="es-GT" sz="2300" b="1">
+                          <a:solidFill>
+                            <a:srgbClr val="4F6228"/>
+                          </a:solidFill>
+                          <a:latin typeface="Bodoni MT"/>
+                          <a:ea typeface="Calibri"/>
+                          <a:cs typeface="Times New Roman"/>
+                        </a:rPr>
+                        <a:t>Tiempo (Horas)</a:t>
+                      </a:r>
+                      <a:endParaRPr lang="es-GT" sz="2300">
+                        <a:solidFill>
+                          <a:srgbClr val="76923C"/>
+                        </a:solidFill>
+                        <a:latin typeface="Calibri"/>
+                        <a:ea typeface="Calibri"/>
+                        <a:cs typeface="Times New Roman"/>
+                      </a:endParaRPr>
+                    </a:p>
+                  </a:txBody>
+                  <a:tcPr marL="146123" marR="146123" marT="0" marB="0">
+                    <a:lnL>
+                      <a:noFill/>
+                    </a:lnL>
+                    <a:lnR>
+                      <a:noFill/>
+                    </a:lnR>
+                    <a:lnT w="12700" cap="flat" cmpd="sng" algn="ctr">
+                      <a:solidFill>
+                        <a:srgbClr val="9BBB59"/>
+                      </a:solidFill>
+                      <a:prstDash val="solid"/>
+                      <a:round/>
+                      <a:headEnd type="none" w="med" len="med"/>
+                      <a:tailEnd type="none" w="med" len="med"/>
+                    </a:lnT>
+                    <a:lnB w="12700" cap="flat" cmpd="sng" algn="ctr">
+                      <a:solidFill>
+                        <a:srgbClr val="9BBB59"/>
+                      </a:solidFill>
+                      <a:prstDash val="solid"/>
+                      <a:round/>
+                      <a:headEnd type="none" w="med" len="med"/>
+                      <a:tailEnd type="none" w="med" len="med"/>
+                    </a:lnB>
+                  </a:tcPr>
+                </a:tc>
+                <a:tc>
+                  <a:txBody>
+                    <a:bodyPr/>
+                    <a:lstStyle/>
+                    <a:p>
+                      <a:pPr algn="ctr">
+                        <a:lnSpc>
+                          <a:spcPct val="115000"/>
+                        </a:lnSpc>
+                        <a:spcAft>
+                          <a:spcPts val="0"/>
+                        </a:spcAft>
+                      </a:pPr>
+                      <a:r>
+                        <a:rPr lang="es-GT" sz="2300" b="1">
+                          <a:solidFill>
+                            <a:srgbClr val="4F6228"/>
+                          </a:solidFill>
+                          <a:latin typeface="Bodoni MT"/>
+                          <a:ea typeface="Calibri"/>
+                          <a:cs typeface="Times New Roman"/>
+                        </a:rPr>
+                        <a:t>Actividad</a:t>
+                      </a:r>
+                      <a:endParaRPr lang="es-GT" sz="2300">
+                        <a:solidFill>
+                          <a:srgbClr val="76923C"/>
+                        </a:solidFill>
+                        <a:latin typeface="Calibri"/>
+                        <a:ea typeface="Calibri"/>
+                        <a:cs typeface="Times New Roman"/>
+                      </a:endParaRPr>
+                    </a:p>
+                  </a:txBody>
+                  <a:tcPr marL="146123" marR="146123" marT="0" marB="0">
+                    <a:lnL>
+                      <a:noFill/>
+                    </a:lnL>
+                    <a:lnR>
+                      <a:noFill/>
+                    </a:lnR>
+                    <a:lnT w="12700" cap="flat" cmpd="sng" algn="ctr">
+                      <a:solidFill>
+                        <a:srgbClr val="9BBB59"/>
+                      </a:solidFill>
+                      <a:prstDash val="solid"/>
+                      <a:round/>
+                      <a:headEnd type="none" w="med" len="med"/>
+                      <a:tailEnd type="none" w="med" len="med"/>
+                    </a:lnT>
+                    <a:lnB w="12700" cap="flat" cmpd="sng" algn="ctr">
+                      <a:solidFill>
+                        <a:srgbClr val="9BBB59"/>
+                      </a:solidFill>
+                      <a:prstDash val="solid"/>
+                      <a:round/>
+                      <a:headEnd type="none" w="med" len="med"/>
+                      <a:tailEnd type="none" w="med" len="med"/>
+                    </a:lnB>
+                  </a:tcPr>
+                </a:tc>
+              </a:tr>
+              <a:tr h="410768">
+                <a:tc>
+                  <a:txBody>
+                    <a:bodyPr/>
+                    <a:lstStyle/>
+                    <a:p>
+                      <a:pPr algn="ctr">
+                        <a:lnSpc>
+                          <a:spcPct val="115000"/>
+                        </a:lnSpc>
+                        <a:spcAft>
+                          <a:spcPts val="0"/>
+                        </a:spcAft>
+                      </a:pPr>
+                      <a:r>
+                        <a:rPr lang="es-GT" sz="2300" b="1">
+                          <a:solidFill>
+                            <a:srgbClr val="4F6228"/>
+                          </a:solidFill>
+                          <a:latin typeface="Bodoni MT"/>
+                          <a:ea typeface="Calibri"/>
+                          <a:cs typeface="Times New Roman"/>
+                        </a:rPr>
+                        <a:t>1</a:t>
+                      </a:r>
+                      <a:endParaRPr lang="es-GT" sz="2300">
+                        <a:solidFill>
+                          <a:srgbClr val="76923C"/>
+                        </a:solidFill>
+                        <a:latin typeface="Calibri"/>
+                        <a:ea typeface="Calibri"/>
+                        <a:cs typeface="Times New Roman"/>
+                      </a:endParaRPr>
+                    </a:p>
+                  </a:txBody>
+                  <a:tcPr marL="146123" marR="146123" marT="0" marB="0">
+                    <a:lnL>
+                      <a:noFill/>
+                    </a:lnL>
+                    <a:lnR>
+                      <a:noFill/>
+                    </a:lnR>
+                    <a:lnT w="12700" cap="flat" cmpd="sng" algn="ctr">
+                      <a:solidFill>
+                        <a:srgbClr val="9BBB59"/>
+                      </a:solidFill>
+                      <a:prstDash val="solid"/>
+                      <a:round/>
+                      <a:headEnd type="none" w="med" len="med"/>
+                      <a:tailEnd type="none" w="med" len="med"/>
+                    </a:lnT>
+                    <a:lnB>
+                      <a:noFill/>
+                    </a:lnB>
+                    <a:solidFill>
+                      <a:srgbClr val="E6EED5"/>
+                    </a:solidFill>
+                  </a:tcPr>
+                </a:tc>
+                <a:tc>
+                  <a:txBody>
+                    <a:bodyPr/>
+                    <a:lstStyle/>
+                    <a:p>
+                      <a:pPr algn="ctr">
+                        <a:lnSpc>
+                          <a:spcPct val="115000"/>
+                        </a:lnSpc>
+                        <a:spcAft>
+                          <a:spcPts val="0"/>
+                        </a:spcAft>
+                      </a:pPr>
+                      <a:r>
+                        <a:rPr lang="es-GT" sz="2300">
+                          <a:solidFill>
+                            <a:srgbClr val="4F6228"/>
+                          </a:solidFill>
+                          <a:latin typeface="Bodoni MT"/>
+                          <a:ea typeface="Calibri"/>
+                          <a:cs typeface="Times New Roman"/>
+                        </a:rPr>
+                        <a:t>Limpieza de Maquina</a:t>
+                      </a:r>
+                      <a:endParaRPr lang="es-GT" sz="2300">
+                        <a:solidFill>
+                          <a:srgbClr val="76923C"/>
+                        </a:solidFill>
+                        <a:latin typeface="Calibri"/>
+                        <a:ea typeface="Calibri"/>
+                        <a:cs typeface="Times New Roman"/>
+                      </a:endParaRPr>
+                    </a:p>
+                  </a:txBody>
+                  <a:tcPr marL="146123" marR="146123" marT="0" marB="0">
+                    <a:lnL>
+                      <a:noFill/>
+                    </a:lnL>
+                    <a:lnR>
+                      <a:noFill/>
+                    </a:lnR>
+                    <a:lnT w="12700" cap="flat" cmpd="sng" algn="ctr">
+                      <a:solidFill>
+                        <a:srgbClr val="9BBB59"/>
+                      </a:solidFill>
+                      <a:prstDash val="solid"/>
+                      <a:round/>
+                      <a:headEnd type="none" w="med" len="med"/>
+                      <a:tailEnd type="none" w="med" len="med"/>
+                    </a:lnT>
+                    <a:lnB>
+                      <a:noFill/>
+                    </a:lnB>
+                    <a:solidFill>
+                      <a:srgbClr val="E6EED5"/>
+                    </a:solidFill>
+                  </a:tcPr>
+                </a:tc>
+              </a:tr>
+              <a:tr h="410768">
+                <a:tc>
+                  <a:txBody>
+                    <a:bodyPr/>
+                    <a:lstStyle/>
+                    <a:p>
+                      <a:pPr algn="ctr">
+                        <a:lnSpc>
+                          <a:spcPct val="115000"/>
+                        </a:lnSpc>
+                        <a:spcAft>
+                          <a:spcPts val="0"/>
+                        </a:spcAft>
+                      </a:pPr>
+                      <a:r>
+                        <a:rPr lang="es-GT" sz="2300" b="1">
+                          <a:solidFill>
+                            <a:srgbClr val="4F6228"/>
+                          </a:solidFill>
+                          <a:latin typeface="Bodoni MT"/>
+                          <a:ea typeface="Calibri"/>
+                          <a:cs typeface="Times New Roman"/>
+                        </a:rPr>
+                        <a:t>0.5</a:t>
+                      </a:r>
+                      <a:endParaRPr lang="es-GT" sz="2300">
+                        <a:solidFill>
+                          <a:srgbClr val="76923C"/>
+                        </a:solidFill>
+                        <a:latin typeface="Calibri"/>
+                        <a:ea typeface="Calibri"/>
+                        <a:cs typeface="Times New Roman"/>
+                      </a:endParaRPr>
+                    </a:p>
+                  </a:txBody>
+                  <a:tcPr marL="146123" marR="146123" marT="0" marB="0">
+                    <a:lnL>
+                      <a:noFill/>
+                    </a:lnL>
+                    <a:lnR>
+                      <a:noFill/>
+                    </a:lnR>
+                    <a:lnT>
+                      <a:noFill/>
+                    </a:lnT>
+                    <a:lnB>
+                      <a:noFill/>
+                    </a:lnB>
+                  </a:tcPr>
+                </a:tc>
+                <a:tc>
+                  <a:txBody>
+                    <a:bodyPr/>
+                    <a:lstStyle/>
+                    <a:p>
+                      <a:pPr algn="ctr">
+                        <a:lnSpc>
+                          <a:spcPct val="115000"/>
+                        </a:lnSpc>
+                        <a:spcAft>
+                          <a:spcPts val="0"/>
+                        </a:spcAft>
+                      </a:pPr>
+                      <a:r>
+                        <a:rPr lang="es-GT" sz="2300">
+                          <a:solidFill>
+                            <a:srgbClr val="4F6228"/>
+                          </a:solidFill>
+                          <a:latin typeface="Bodoni MT"/>
+                          <a:ea typeface="Calibri"/>
+                          <a:cs typeface="Times New Roman"/>
+                        </a:rPr>
+                        <a:t>Instalación del Sistema Operativo</a:t>
+                      </a:r>
+                      <a:endParaRPr lang="es-GT" sz="2300">
+                        <a:solidFill>
+                          <a:srgbClr val="76923C"/>
+                        </a:solidFill>
+                        <a:latin typeface="Calibri"/>
+                        <a:ea typeface="Calibri"/>
+                        <a:cs typeface="Times New Roman"/>
+                      </a:endParaRPr>
+                    </a:p>
+                  </a:txBody>
+                  <a:tcPr marL="146123" marR="146123" marT="0" marB="0">
+                    <a:lnL>
+                      <a:noFill/>
+                    </a:lnL>
+                    <a:lnR>
+                      <a:noFill/>
+                    </a:lnR>
+                    <a:lnT>
+                      <a:noFill/>
+                    </a:lnT>
+                    <a:lnB>
+                      <a:noFill/>
+                    </a:lnB>
+                  </a:tcPr>
+                </a:tc>
+              </a:tr>
+              <a:tr h="410768">
+                <a:tc>
+                  <a:txBody>
+                    <a:bodyPr/>
+                    <a:lstStyle/>
+                    <a:p>
+                      <a:pPr algn="ctr">
+                        <a:lnSpc>
+                          <a:spcPct val="115000"/>
+                        </a:lnSpc>
+                        <a:spcAft>
+                          <a:spcPts val="0"/>
+                        </a:spcAft>
+                      </a:pPr>
+                      <a:r>
+                        <a:rPr lang="es-GT" sz="2300" b="1">
+                          <a:solidFill>
+                            <a:srgbClr val="4F6228"/>
+                          </a:solidFill>
+                          <a:latin typeface="Bodoni MT"/>
+                          <a:ea typeface="Calibri"/>
+                          <a:cs typeface="Times New Roman"/>
+                        </a:rPr>
+                        <a:t>0.5</a:t>
+                      </a:r>
+                      <a:endParaRPr lang="es-GT" sz="2300">
+                        <a:solidFill>
+                          <a:srgbClr val="76923C"/>
+                        </a:solidFill>
+                        <a:latin typeface="Calibri"/>
+                        <a:ea typeface="Calibri"/>
+                        <a:cs typeface="Times New Roman"/>
+                      </a:endParaRPr>
+                    </a:p>
+                  </a:txBody>
+                  <a:tcPr marL="146123" marR="146123" marT="0" marB="0">
+                    <a:lnL>
+                      <a:noFill/>
+                    </a:lnL>
+                    <a:lnR>
+                      <a:noFill/>
+                    </a:lnR>
+                    <a:lnT>
+                      <a:noFill/>
+                    </a:lnT>
+                    <a:lnB>
+                      <a:noFill/>
+                    </a:lnB>
+                    <a:solidFill>
+                      <a:srgbClr val="E6EED5"/>
+                    </a:solidFill>
+                  </a:tcPr>
+                </a:tc>
+                <a:tc>
+                  <a:txBody>
+                    <a:bodyPr/>
+                    <a:lstStyle/>
+                    <a:p>
+                      <a:pPr algn="ctr">
+                        <a:lnSpc>
+                          <a:spcPct val="115000"/>
+                        </a:lnSpc>
+                        <a:spcAft>
+                          <a:spcPts val="0"/>
+                        </a:spcAft>
+                      </a:pPr>
+                      <a:r>
+                        <a:rPr lang="es-GT" sz="2300">
+                          <a:solidFill>
+                            <a:srgbClr val="4F6228"/>
+                          </a:solidFill>
+                          <a:latin typeface="Bodoni MT"/>
+                          <a:ea typeface="Calibri"/>
+                          <a:cs typeface="Times New Roman"/>
+                        </a:rPr>
+                        <a:t>Revisión de funcionamiento</a:t>
+                      </a:r>
+                      <a:endParaRPr lang="es-GT" sz="2300">
+                        <a:solidFill>
+                          <a:srgbClr val="76923C"/>
+                        </a:solidFill>
+                        <a:latin typeface="Calibri"/>
+                        <a:ea typeface="Calibri"/>
+                        <a:cs typeface="Times New Roman"/>
+                      </a:endParaRPr>
+                    </a:p>
+                  </a:txBody>
+                  <a:tcPr marL="146123" marR="146123" marT="0" marB="0">
+                    <a:lnL>
+                      <a:noFill/>
+                    </a:lnL>
+                    <a:lnR>
+                      <a:noFill/>
+                    </a:lnR>
+                    <a:lnT>
+                      <a:noFill/>
+                    </a:lnT>
+                    <a:lnB>
+                      <a:noFill/>
+                    </a:lnB>
+                    <a:solidFill>
+                      <a:srgbClr val="E6EED5"/>
+                    </a:solidFill>
+                  </a:tcPr>
+                </a:tc>
+              </a:tr>
+              <a:tr h="410768">
+                <a:tc>
+                  <a:txBody>
+                    <a:bodyPr/>
+                    <a:lstStyle/>
+                    <a:p>
+                      <a:pPr algn="ctr">
+                        <a:lnSpc>
+                          <a:spcPct val="115000"/>
+                        </a:lnSpc>
+                        <a:spcAft>
+                          <a:spcPts val="0"/>
+                        </a:spcAft>
+                      </a:pPr>
+                      <a:r>
+                        <a:rPr lang="es-GT" sz="2300" b="1">
+                          <a:solidFill>
+                            <a:srgbClr val="4F6228"/>
+                          </a:solidFill>
+                          <a:latin typeface="Bodoni MT"/>
+                          <a:ea typeface="Calibri"/>
+                          <a:cs typeface="Times New Roman"/>
+                        </a:rPr>
+                        <a:t>1</a:t>
+                      </a:r>
+                      <a:endParaRPr lang="es-GT" sz="2300">
+                        <a:solidFill>
+                          <a:srgbClr val="76923C"/>
+                        </a:solidFill>
+                        <a:latin typeface="Calibri"/>
+                        <a:ea typeface="Calibri"/>
+                        <a:cs typeface="Times New Roman"/>
+                      </a:endParaRPr>
+                    </a:p>
+                  </a:txBody>
+                  <a:tcPr marL="146123" marR="146123" marT="0" marB="0">
+                    <a:lnL>
+                      <a:noFill/>
+                    </a:lnL>
+                    <a:lnR>
+                      <a:noFill/>
+                    </a:lnR>
+                    <a:lnT>
+                      <a:noFill/>
+                    </a:lnT>
+                    <a:lnB>
+                      <a:noFill/>
+                    </a:lnB>
+                  </a:tcPr>
+                </a:tc>
+                <a:tc>
+                  <a:txBody>
+                    <a:bodyPr/>
+                    <a:lstStyle/>
+                    <a:p>
+                      <a:pPr algn="ctr">
+                        <a:lnSpc>
+                          <a:spcPct val="115000"/>
+                        </a:lnSpc>
+                        <a:spcAft>
+                          <a:spcPts val="0"/>
+                        </a:spcAft>
+                      </a:pPr>
+                      <a:r>
+                        <a:rPr lang="es-GT" sz="2300">
+                          <a:solidFill>
+                            <a:srgbClr val="4F6228"/>
+                          </a:solidFill>
+                          <a:latin typeface="Bodoni MT"/>
+                          <a:ea typeface="Calibri"/>
+                          <a:cs typeface="Times New Roman"/>
+                        </a:rPr>
+                        <a:t>Instalación de  .NET</a:t>
+                      </a:r>
+                      <a:endParaRPr lang="es-GT" sz="2300">
+                        <a:solidFill>
+                          <a:srgbClr val="76923C"/>
+                        </a:solidFill>
+                        <a:latin typeface="Calibri"/>
+                        <a:ea typeface="Calibri"/>
+                        <a:cs typeface="Times New Roman"/>
+                      </a:endParaRPr>
+                    </a:p>
+                  </a:txBody>
+                  <a:tcPr marL="146123" marR="146123" marT="0" marB="0">
+                    <a:lnL>
+                      <a:noFill/>
+                    </a:lnL>
+                    <a:lnR>
+                      <a:noFill/>
+                    </a:lnR>
+                    <a:lnT>
+                      <a:noFill/>
+                    </a:lnT>
+                    <a:lnB>
+                      <a:noFill/>
+                    </a:lnB>
+                  </a:tcPr>
+                </a:tc>
+              </a:tr>
+              <a:tr h="410768">
+                <a:tc>
+                  <a:txBody>
+                    <a:bodyPr/>
+                    <a:lstStyle/>
+                    <a:p>
+                      <a:pPr algn="ctr">
+                        <a:lnSpc>
+                          <a:spcPct val="115000"/>
+                        </a:lnSpc>
+                        <a:spcAft>
+                          <a:spcPts val="0"/>
+                        </a:spcAft>
+                      </a:pPr>
+                      <a:r>
+                        <a:rPr lang="es-GT" sz="2300" b="1">
+                          <a:solidFill>
+                            <a:srgbClr val="4F6228"/>
+                          </a:solidFill>
+                          <a:latin typeface="Bodoni MT"/>
+                          <a:ea typeface="Calibri"/>
+                          <a:cs typeface="Times New Roman"/>
+                        </a:rPr>
+                        <a:t>1.5</a:t>
+                      </a:r>
+                      <a:endParaRPr lang="es-GT" sz="2300">
+                        <a:solidFill>
+                          <a:srgbClr val="76923C"/>
+                        </a:solidFill>
+                        <a:latin typeface="Calibri"/>
+                        <a:ea typeface="Calibri"/>
+                        <a:cs typeface="Times New Roman"/>
+                      </a:endParaRPr>
+                    </a:p>
+                  </a:txBody>
+                  <a:tcPr marL="146123" marR="146123" marT="0" marB="0">
+                    <a:lnL>
+                      <a:noFill/>
+                    </a:lnL>
+                    <a:lnR>
+                      <a:noFill/>
+                    </a:lnR>
+                    <a:lnT>
+                      <a:noFill/>
+                    </a:lnT>
+                    <a:lnB>
+                      <a:noFill/>
+                    </a:lnB>
+                    <a:solidFill>
+                      <a:srgbClr val="E6EED5"/>
+                    </a:solidFill>
+                  </a:tcPr>
+                </a:tc>
+                <a:tc>
+                  <a:txBody>
+                    <a:bodyPr/>
+                    <a:lstStyle/>
+                    <a:p>
+                      <a:pPr algn="ctr">
+                        <a:lnSpc>
+                          <a:spcPct val="115000"/>
+                        </a:lnSpc>
+                        <a:spcAft>
+                          <a:spcPts val="0"/>
+                        </a:spcAft>
+                      </a:pPr>
+                      <a:r>
+                        <a:rPr lang="es-GT" sz="2300">
+                          <a:solidFill>
+                            <a:srgbClr val="4F6228"/>
+                          </a:solidFill>
+                          <a:latin typeface="Bodoni MT"/>
+                          <a:ea typeface="Calibri"/>
+                          <a:cs typeface="Times New Roman"/>
+                        </a:rPr>
+                        <a:t>Instalación de SQL Server</a:t>
+                      </a:r>
+                      <a:endParaRPr lang="es-GT" sz="2300">
+                        <a:solidFill>
+                          <a:srgbClr val="76923C"/>
+                        </a:solidFill>
+                        <a:latin typeface="Calibri"/>
+                        <a:ea typeface="Calibri"/>
+                        <a:cs typeface="Times New Roman"/>
+                      </a:endParaRPr>
+                    </a:p>
+                  </a:txBody>
+                  <a:tcPr marL="146123" marR="146123" marT="0" marB="0">
+                    <a:lnL>
+                      <a:noFill/>
+                    </a:lnL>
+                    <a:lnR>
+                      <a:noFill/>
+                    </a:lnR>
+                    <a:lnT>
+                      <a:noFill/>
+                    </a:lnT>
+                    <a:lnB>
+                      <a:noFill/>
+                    </a:lnB>
+                    <a:solidFill>
+                      <a:srgbClr val="E6EED5"/>
+                    </a:solidFill>
+                  </a:tcPr>
+                </a:tc>
+              </a:tr>
+              <a:tr h="410768">
+                <a:tc>
+                  <a:txBody>
+                    <a:bodyPr/>
+                    <a:lstStyle/>
+                    <a:p>
+                      <a:pPr algn="ctr">
+                        <a:lnSpc>
+                          <a:spcPct val="115000"/>
+                        </a:lnSpc>
+                        <a:spcAft>
+                          <a:spcPts val="0"/>
+                        </a:spcAft>
+                      </a:pPr>
+                      <a:r>
+                        <a:rPr lang="es-GT" sz="2300" b="1">
+                          <a:solidFill>
+                            <a:srgbClr val="4F6228"/>
+                          </a:solidFill>
+                          <a:latin typeface="Bodoni MT"/>
+                          <a:ea typeface="Calibri"/>
+                          <a:cs typeface="Times New Roman"/>
+                        </a:rPr>
+                        <a:t>0.5</a:t>
+                      </a:r>
+                      <a:endParaRPr lang="es-GT" sz="2300">
+                        <a:solidFill>
+                          <a:srgbClr val="76923C"/>
+                        </a:solidFill>
+                        <a:latin typeface="Calibri"/>
+                        <a:ea typeface="Calibri"/>
+                        <a:cs typeface="Times New Roman"/>
+                      </a:endParaRPr>
+                    </a:p>
+                  </a:txBody>
+                  <a:tcPr marL="146123" marR="146123" marT="0" marB="0">
+                    <a:lnL>
+                      <a:noFill/>
+                    </a:lnL>
+                    <a:lnR>
+                      <a:noFill/>
+                    </a:lnR>
+                    <a:lnT>
+                      <a:noFill/>
+                    </a:lnT>
+                    <a:lnB>
+                      <a:noFill/>
+                    </a:lnB>
+                  </a:tcPr>
+                </a:tc>
+                <a:tc>
+                  <a:txBody>
+                    <a:bodyPr/>
+                    <a:lstStyle/>
+                    <a:p>
+                      <a:pPr algn="ctr">
+                        <a:lnSpc>
+                          <a:spcPct val="115000"/>
+                        </a:lnSpc>
+                        <a:spcAft>
+                          <a:spcPts val="0"/>
+                        </a:spcAft>
+                      </a:pPr>
+                      <a:r>
+                        <a:rPr lang="es-GT" sz="2300">
+                          <a:solidFill>
+                            <a:srgbClr val="4F6228"/>
+                          </a:solidFill>
+                          <a:latin typeface="Bodoni MT"/>
+                          <a:ea typeface="Calibri"/>
+                          <a:cs typeface="Times New Roman"/>
+                        </a:rPr>
+                        <a:t>Instalación de Base de Datos</a:t>
+                      </a:r>
+                      <a:endParaRPr lang="es-GT" sz="2300">
+                        <a:solidFill>
+                          <a:srgbClr val="76923C"/>
+                        </a:solidFill>
+                        <a:latin typeface="Calibri"/>
+                        <a:ea typeface="Calibri"/>
+                        <a:cs typeface="Times New Roman"/>
+                      </a:endParaRPr>
+                    </a:p>
+                  </a:txBody>
+                  <a:tcPr marL="146123" marR="146123" marT="0" marB="0">
+                    <a:lnL>
+                      <a:noFill/>
+                    </a:lnL>
+                    <a:lnR>
+                      <a:noFill/>
+                    </a:lnR>
+                    <a:lnT>
+                      <a:noFill/>
+                    </a:lnT>
+                    <a:lnB>
+                      <a:noFill/>
+                    </a:lnB>
+                  </a:tcPr>
+                </a:tc>
+              </a:tr>
+              <a:tr h="410768">
+                <a:tc>
+                  <a:txBody>
+                    <a:bodyPr/>
+                    <a:lstStyle/>
+                    <a:p>
+                      <a:pPr algn="ctr">
+                        <a:lnSpc>
+                          <a:spcPct val="115000"/>
+                        </a:lnSpc>
+                        <a:spcAft>
+                          <a:spcPts val="0"/>
+                        </a:spcAft>
+                      </a:pPr>
+                      <a:r>
+                        <a:rPr lang="es-GT" sz="2300" b="1">
+                          <a:solidFill>
+                            <a:srgbClr val="4F6228"/>
+                          </a:solidFill>
+                          <a:latin typeface="Bodoni MT"/>
+                          <a:ea typeface="Calibri"/>
+                          <a:cs typeface="Times New Roman"/>
+                        </a:rPr>
+                        <a:t>0.5</a:t>
+                      </a:r>
+                      <a:endParaRPr lang="es-GT" sz="2300">
+                        <a:solidFill>
+                          <a:srgbClr val="76923C"/>
+                        </a:solidFill>
+                        <a:latin typeface="Calibri"/>
+                        <a:ea typeface="Calibri"/>
+                        <a:cs typeface="Times New Roman"/>
+                      </a:endParaRPr>
+                    </a:p>
+                  </a:txBody>
+                  <a:tcPr marL="146123" marR="146123" marT="0" marB="0">
+                    <a:lnL>
+                      <a:noFill/>
+                    </a:lnL>
+                    <a:lnR>
+                      <a:noFill/>
+                    </a:lnR>
+                    <a:lnT>
+                      <a:noFill/>
+                    </a:lnT>
+                    <a:lnB>
+                      <a:noFill/>
+                    </a:lnB>
+                    <a:solidFill>
+                      <a:srgbClr val="E6EED5"/>
+                    </a:solidFill>
+                  </a:tcPr>
+                </a:tc>
+                <a:tc>
+                  <a:txBody>
+                    <a:bodyPr/>
+                    <a:lstStyle/>
+                    <a:p>
+                      <a:pPr algn="ctr">
+                        <a:lnSpc>
+                          <a:spcPct val="115000"/>
+                        </a:lnSpc>
+                        <a:spcAft>
+                          <a:spcPts val="0"/>
+                        </a:spcAft>
+                      </a:pPr>
+                      <a:r>
+                        <a:rPr lang="es-GT" sz="2300">
+                          <a:solidFill>
+                            <a:srgbClr val="4F6228"/>
+                          </a:solidFill>
+                          <a:latin typeface="Bodoni MT"/>
+                          <a:ea typeface="Calibri"/>
+                          <a:cs typeface="Times New Roman"/>
+                        </a:rPr>
+                        <a:t>Instalación de CrystalReports 13</a:t>
+                      </a:r>
+                      <a:endParaRPr lang="es-GT" sz="2300">
+                        <a:solidFill>
+                          <a:srgbClr val="76923C"/>
+                        </a:solidFill>
+                        <a:latin typeface="Calibri"/>
+                        <a:ea typeface="Calibri"/>
+                        <a:cs typeface="Times New Roman"/>
+                      </a:endParaRPr>
+                    </a:p>
+                  </a:txBody>
+                  <a:tcPr marL="146123" marR="146123" marT="0" marB="0">
+                    <a:lnL>
+                      <a:noFill/>
+                    </a:lnL>
+                    <a:lnR>
+                      <a:noFill/>
+                    </a:lnR>
+                    <a:lnT>
+                      <a:noFill/>
+                    </a:lnT>
+                    <a:lnB>
+                      <a:noFill/>
+                    </a:lnB>
+                    <a:solidFill>
+                      <a:srgbClr val="E6EED5"/>
+                    </a:solidFill>
+                  </a:tcPr>
+                </a:tc>
+              </a:tr>
+              <a:tr h="410768">
+                <a:tc>
+                  <a:txBody>
+                    <a:bodyPr/>
+                    <a:lstStyle/>
+                    <a:p>
+                      <a:pPr algn="ctr">
+                        <a:lnSpc>
+                          <a:spcPct val="115000"/>
+                        </a:lnSpc>
+                        <a:spcAft>
+                          <a:spcPts val="0"/>
+                        </a:spcAft>
+                      </a:pPr>
+                      <a:r>
+                        <a:rPr lang="es-GT" sz="2300" b="1">
+                          <a:solidFill>
+                            <a:srgbClr val="4F6228"/>
+                          </a:solidFill>
+                          <a:latin typeface="Bodoni MT"/>
+                          <a:ea typeface="Calibri"/>
+                          <a:cs typeface="Times New Roman"/>
+                        </a:rPr>
+                        <a:t>0.5</a:t>
+                      </a:r>
+                      <a:endParaRPr lang="es-GT" sz="2300">
+                        <a:solidFill>
+                          <a:srgbClr val="76923C"/>
+                        </a:solidFill>
+                        <a:latin typeface="Calibri"/>
+                        <a:ea typeface="Calibri"/>
+                        <a:cs typeface="Times New Roman"/>
+                      </a:endParaRPr>
+                    </a:p>
+                  </a:txBody>
+                  <a:tcPr marL="146123" marR="146123" marT="0" marB="0">
+                    <a:lnL>
+                      <a:noFill/>
+                    </a:lnL>
+                    <a:lnR>
+                      <a:noFill/>
+                    </a:lnR>
+                    <a:lnT>
+                      <a:noFill/>
+                    </a:lnT>
+                    <a:lnB>
+                      <a:noFill/>
+                    </a:lnB>
+                  </a:tcPr>
+                </a:tc>
+                <a:tc>
+                  <a:txBody>
+                    <a:bodyPr/>
+                    <a:lstStyle/>
+                    <a:p>
+                      <a:pPr algn="ctr">
+                        <a:lnSpc>
+                          <a:spcPct val="115000"/>
+                        </a:lnSpc>
+                        <a:spcAft>
+                          <a:spcPts val="0"/>
+                        </a:spcAft>
+                      </a:pPr>
+                      <a:r>
+                        <a:rPr lang="es-GT" sz="2300">
+                          <a:solidFill>
+                            <a:srgbClr val="4F6228"/>
+                          </a:solidFill>
+                          <a:latin typeface="Bodoni MT"/>
+                          <a:ea typeface="Calibri"/>
+                          <a:cs typeface="Times New Roman"/>
+                        </a:rPr>
+                        <a:t>Instalación de Dattex Plus</a:t>
+                      </a:r>
+                      <a:endParaRPr lang="es-GT" sz="2300">
+                        <a:solidFill>
+                          <a:srgbClr val="76923C"/>
+                        </a:solidFill>
+                        <a:latin typeface="Calibri"/>
+                        <a:ea typeface="Calibri"/>
+                        <a:cs typeface="Times New Roman"/>
+                      </a:endParaRPr>
+                    </a:p>
+                  </a:txBody>
+                  <a:tcPr marL="146123" marR="146123" marT="0" marB="0">
+                    <a:lnL>
+                      <a:noFill/>
+                    </a:lnL>
+                    <a:lnR>
+                      <a:noFill/>
+                    </a:lnR>
+                    <a:lnT>
+                      <a:noFill/>
+                    </a:lnT>
+                    <a:lnB>
+                      <a:noFill/>
+                    </a:lnB>
+                  </a:tcPr>
+                </a:tc>
+              </a:tr>
+              <a:tr h="821537">
+                <a:tc>
+                  <a:txBody>
+                    <a:bodyPr/>
+                    <a:lstStyle/>
+                    <a:p>
+                      <a:pPr algn="ctr">
+                        <a:lnSpc>
+                          <a:spcPct val="115000"/>
+                        </a:lnSpc>
+                        <a:spcAft>
+                          <a:spcPts val="0"/>
+                        </a:spcAft>
+                      </a:pPr>
+                      <a:r>
+                        <a:rPr lang="es-GT" sz="2300" b="1">
+                          <a:solidFill>
+                            <a:srgbClr val="4F6228"/>
+                          </a:solidFill>
+                          <a:latin typeface="Bodoni MT"/>
+                          <a:ea typeface="Calibri"/>
+                          <a:cs typeface="Times New Roman"/>
+                        </a:rPr>
+                        <a:t>2</a:t>
+                      </a:r>
+                      <a:endParaRPr lang="es-GT" sz="2300">
+                        <a:solidFill>
+                          <a:srgbClr val="76923C"/>
+                        </a:solidFill>
+                        <a:latin typeface="Calibri"/>
+                        <a:ea typeface="Calibri"/>
+                        <a:cs typeface="Times New Roman"/>
+                      </a:endParaRPr>
+                    </a:p>
+                  </a:txBody>
+                  <a:tcPr marL="146123" marR="146123" marT="0" marB="0">
+                    <a:lnL>
+                      <a:noFill/>
+                    </a:lnL>
+                    <a:lnR>
+                      <a:noFill/>
+                    </a:lnR>
+                    <a:lnT>
+                      <a:noFill/>
+                    </a:lnT>
+                    <a:lnB>
+                      <a:noFill/>
+                    </a:lnB>
+                    <a:solidFill>
+                      <a:srgbClr val="E6EED5"/>
+                    </a:solidFill>
+                  </a:tcPr>
+                </a:tc>
+                <a:tc>
+                  <a:txBody>
+                    <a:bodyPr/>
+                    <a:lstStyle/>
+                    <a:p>
+                      <a:pPr algn="ctr">
+                        <a:lnSpc>
+                          <a:spcPct val="115000"/>
+                        </a:lnSpc>
+                        <a:spcAft>
+                          <a:spcPts val="0"/>
+                        </a:spcAft>
+                      </a:pPr>
+                      <a:r>
+                        <a:rPr lang="es-GT" sz="2300">
+                          <a:solidFill>
+                            <a:srgbClr val="4F6228"/>
+                          </a:solidFill>
+                          <a:latin typeface="Bodoni MT"/>
+                          <a:ea typeface="Calibri"/>
+                          <a:cs typeface="Times New Roman"/>
+                        </a:rPr>
+                        <a:t>Pruebas de funcionamiento de aplicación</a:t>
+                      </a:r>
+                      <a:endParaRPr lang="es-GT" sz="2300">
+                        <a:solidFill>
+                          <a:srgbClr val="76923C"/>
+                        </a:solidFill>
+                        <a:latin typeface="Calibri"/>
+                        <a:ea typeface="Calibri"/>
+                        <a:cs typeface="Times New Roman"/>
+                      </a:endParaRPr>
+                    </a:p>
+                  </a:txBody>
+                  <a:tcPr marL="146123" marR="146123" marT="0" marB="0">
+                    <a:lnL>
+                      <a:noFill/>
+                    </a:lnL>
+                    <a:lnR>
+                      <a:noFill/>
+                    </a:lnR>
+                    <a:lnT>
+                      <a:noFill/>
+                    </a:lnT>
+                    <a:lnB>
+                      <a:noFill/>
+                    </a:lnB>
+                    <a:solidFill>
+                      <a:srgbClr val="E6EED5"/>
+                    </a:solidFill>
+                  </a:tcPr>
+                </a:tc>
+              </a:tr>
+              <a:tr h="410768">
+                <a:tc>
+                  <a:txBody>
+                    <a:bodyPr/>
+                    <a:lstStyle/>
+                    <a:p>
+                      <a:pPr algn="ctr">
+                        <a:lnSpc>
+                          <a:spcPct val="115000"/>
+                        </a:lnSpc>
+                        <a:spcAft>
+                          <a:spcPts val="0"/>
+                        </a:spcAft>
+                      </a:pPr>
+                      <a:r>
+                        <a:rPr lang="es-GT" sz="2300" b="1">
+                          <a:solidFill>
+                            <a:srgbClr val="4F6228"/>
+                          </a:solidFill>
+                          <a:latin typeface="Bodoni MT"/>
+                          <a:ea typeface="Calibri"/>
+                          <a:cs typeface="Times New Roman"/>
+                        </a:rPr>
+                        <a:t>7 horas</a:t>
+                      </a:r>
+                      <a:endParaRPr lang="es-GT" sz="2300">
+                        <a:solidFill>
+                          <a:srgbClr val="76923C"/>
+                        </a:solidFill>
+                        <a:latin typeface="Calibri"/>
+                        <a:ea typeface="Calibri"/>
+                        <a:cs typeface="Times New Roman"/>
+                      </a:endParaRPr>
+                    </a:p>
+                  </a:txBody>
+                  <a:tcPr marL="146123" marR="146123" marT="0" marB="0">
+                    <a:lnL>
+                      <a:noFill/>
+                    </a:lnL>
+                    <a:lnR>
+                      <a:noFill/>
+                    </a:lnR>
+                    <a:lnT>
+                      <a:noFill/>
+                    </a:lnT>
+                    <a:lnB w="12700" cap="flat" cmpd="sng" algn="ctr">
+                      <a:solidFill>
+                        <a:srgbClr val="9BBB59"/>
+                      </a:solidFill>
+                      <a:prstDash val="solid"/>
+                      <a:round/>
+                      <a:headEnd type="none" w="med" len="med"/>
+                      <a:tailEnd type="none" w="med" len="med"/>
+                    </a:lnB>
+                    <a:pattFill prst="pct20">
+                      <a:fgClr>
+                        <a:srgbClr val="76923C"/>
+                      </a:fgClr>
+                      <a:bgClr>
+                        <a:srgbClr val="CCCCCC"/>
+                      </a:bgClr>
+                    </a:pattFill>
+                  </a:tcPr>
+                </a:tc>
+                <a:tc>
+                  <a:txBody>
+                    <a:bodyPr/>
+                    <a:lstStyle/>
+                    <a:p>
+                      <a:pPr algn="ctr">
+                        <a:lnSpc>
+                          <a:spcPct val="115000"/>
+                        </a:lnSpc>
+                        <a:spcAft>
+                          <a:spcPts val="0"/>
+                        </a:spcAft>
+                      </a:pPr>
+                      <a:r>
+                        <a:rPr lang="es-GT" sz="2300" dirty="0">
+                          <a:solidFill>
+                            <a:srgbClr val="4F6228"/>
+                          </a:solidFill>
+                          <a:latin typeface="Bodoni MT"/>
+                          <a:ea typeface="Calibri"/>
+                          <a:cs typeface="Times New Roman"/>
+                        </a:rPr>
+                        <a:t>TOTAL</a:t>
+                      </a:r>
+                      <a:endParaRPr lang="es-GT" sz="2300" dirty="0">
+                        <a:solidFill>
+                          <a:srgbClr val="76923C"/>
+                        </a:solidFill>
+                        <a:latin typeface="Calibri"/>
+                        <a:ea typeface="Calibri"/>
+                        <a:cs typeface="Times New Roman"/>
+                      </a:endParaRPr>
+                    </a:p>
+                  </a:txBody>
+                  <a:tcPr marL="146123" marR="146123" marT="0" marB="0">
+                    <a:lnL>
+                      <a:noFill/>
+                    </a:lnL>
+                    <a:lnR>
+                      <a:noFill/>
+                    </a:lnR>
+                    <a:lnT>
+                      <a:noFill/>
+                    </a:lnT>
+                    <a:lnB w="12700" cap="flat" cmpd="sng" algn="ctr">
+                      <a:solidFill>
+                        <a:srgbClr val="9BBB59"/>
+                      </a:solidFill>
+                      <a:prstDash val="solid"/>
+                      <a:round/>
+                      <a:headEnd type="none" w="med" len="med"/>
+                      <a:tailEnd type="none" w="med" len="med"/>
+                    </a:lnB>
+                    <a:pattFill prst="pct20">
+                      <a:fgClr>
+                        <a:srgbClr val="76923C"/>
+                      </a:fgClr>
+                      <a:bgClr>
+                        <a:srgbClr val="CCCCCC"/>
+                      </a:bgClr>
+                    </a:pattFill>
+                  </a:tcPr>
+                </a:tc>
+              </a:tr>
+            </a:tbl>
+          </a:graphicData>
+        </a:graphic>
+      </p:graphicFrame>
+    </p:spTree>
+  </p:cSld>
+  <p:clrMapOvr>
+    <a:masterClrMapping/>
+  </p:clrMapOvr>
+</p:sld>
+</file>
+
+<file path=ppt/slides/slide18.xml><?xml version="1.0" encoding="utf-8"?>
 <p:sld xmlns:a="http://schemas.openxmlformats.org/drawingml/2006/main" xmlns:r="http://schemas.openxmlformats.org/officeDocument/2006/relationships" xmlns:p="http://schemas.openxmlformats.org/presentationml/2006/main">
   <p:cSld>
     <p:spTree>

</xml_diff>